<commit_message>
docs: add modifications to pptx
</commit_message>
<xml_diff>
--- a/doc/Présentation projet libre.pptx
+++ b/doc/Présentation projet libre.pptx
@@ -8,12 +8,15 @@
     <p:sldId id="256" r:id="rId2"/>
     <p:sldId id="257" r:id="rId3"/>
     <p:sldId id="259" r:id="rId4"/>
-    <p:sldId id="258" r:id="rId5"/>
-    <p:sldId id="263" r:id="rId6"/>
-    <p:sldId id="264" r:id="rId7"/>
-    <p:sldId id="261" r:id="rId8"/>
-    <p:sldId id="262" r:id="rId9"/>
-    <p:sldId id="260" r:id="rId10"/>
+    <p:sldId id="265" r:id="rId5"/>
+    <p:sldId id="266" r:id="rId6"/>
+    <p:sldId id="267" r:id="rId7"/>
+    <p:sldId id="263" r:id="rId8"/>
+    <p:sldId id="268" r:id="rId9"/>
+    <p:sldId id="264" r:id="rId10"/>
+    <p:sldId id="261" r:id="rId11"/>
+    <p:sldId id="262" r:id="rId12"/>
+    <p:sldId id="260" r:id="rId13"/>
   </p:sldIdLst>
   <p:sldSz cx="12192000" cy="6858000"/>
   <p:notesSz cx="6858000" cy="9144000"/>
@@ -249,7 +252,7 @@
           <a:p>
             <a:fld id="{638941B0-F4D5-4460-BCAD-F7E2B41A8257}" type="datetimeFigureOut">
               <a:rPr lang="de-DE" smtClean="0"/>
-              <a:t>14.10.2018</a:t>
+              <a:t>18.10.2018</a:t>
             </a:fld>
             <a:endParaRPr lang="de-DE"/>
           </a:p>
@@ -417,7 +420,7 @@
           <a:p>
             <a:fld id="{638941B0-F4D5-4460-BCAD-F7E2B41A8257}" type="datetimeFigureOut">
               <a:rPr lang="de-DE" smtClean="0"/>
-              <a:t>14.10.2018</a:t>
+              <a:t>18.10.2018</a:t>
             </a:fld>
             <a:endParaRPr lang="de-DE"/>
           </a:p>
@@ -595,7 +598,7 @@
           <a:p>
             <a:fld id="{638941B0-F4D5-4460-BCAD-F7E2B41A8257}" type="datetimeFigureOut">
               <a:rPr lang="de-DE" smtClean="0"/>
-              <a:t>14.10.2018</a:t>
+              <a:t>18.10.2018</a:t>
             </a:fld>
             <a:endParaRPr lang="de-DE"/>
           </a:p>
@@ -763,7 +766,7 @@
           <a:p>
             <a:fld id="{638941B0-F4D5-4460-BCAD-F7E2B41A8257}" type="datetimeFigureOut">
               <a:rPr lang="de-DE" smtClean="0"/>
-              <a:t>14.10.2018</a:t>
+              <a:t>18.10.2018</a:t>
             </a:fld>
             <a:endParaRPr lang="de-DE"/>
           </a:p>
@@ -1008,7 +1011,7 @@
           <a:p>
             <a:fld id="{638941B0-F4D5-4460-BCAD-F7E2B41A8257}" type="datetimeFigureOut">
               <a:rPr lang="de-DE" smtClean="0"/>
-              <a:t>14.10.2018</a:t>
+              <a:t>18.10.2018</a:t>
             </a:fld>
             <a:endParaRPr lang="de-DE"/>
           </a:p>
@@ -1237,7 +1240,7 @@
           <a:p>
             <a:fld id="{638941B0-F4D5-4460-BCAD-F7E2B41A8257}" type="datetimeFigureOut">
               <a:rPr lang="de-DE" smtClean="0"/>
-              <a:t>14.10.2018</a:t>
+              <a:t>18.10.2018</a:t>
             </a:fld>
             <a:endParaRPr lang="de-DE"/>
           </a:p>
@@ -1601,7 +1604,7 @@
           <a:p>
             <a:fld id="{638941B0-F4D5-4460-BCAD-F7E2B41A8257}" type="datetimeFigureOut">
               <a:rPr lang="de-DE" smtClean="0"/>
-              <a:t>14.10.2018</a:t>
+              <a:t>18.10.2018</a:t>
             </a:fld>
             <a:endParaRPr lang="de-DE"/>
           </a:p>
@@ -1718,7 +1721,7 @@
           <a:p>
             <a:fld id="{638941B0-F4D5-4460-BCAD-F7E2B41A8257}" type="datetimeFigureOut">
               <a:rPr lang="de-DE" smtClean="0"/>
-              <a:t>14.10.2018</a:t>
+              <a:t>18.10.2018</a:t>
             </a:fld>
             <a:endParaRPr lang="de-DE"/>
           </a:p>
@@ -1813,7 +1816,7 @@
           <a:p>
             <a:fld id="{638941B0-F4D5-4460-BCAD-F7E2B41A8257}" type="datetimeFigureOut">
               <a:rPr lang="de-DE" smtClean="0"/>
-              <a:t>14.10.2018</a:t>
+              <a:t>18.10.2018</a:t>
             </a:fld>
             <a:endParaRPr lang="de-DE"/>
           </a:p>
@@ -2088,7 +2091,7 @@
           <a:p>
             <a:fld id="{638941B0-F4D5-4460-BCAD-F7E2B41A8257}" type="datetimeFigureOut">
               <a:rPr lang="de-DE" smtClean="0"/>
-              <a:t>14.10.2018</a:t>
+              <a:t>18.10.2018</a:t>
             </a:fld>
             <a:endParaRPr lang="de-DE"/>
           </a:p>
@@ -2343,7 +2346,7 @@
           <a:p>
             <a:fld id="{638941B0-F4D5-4460-BCAD-F7E2B41A8257}" type="datetimeFigureOut">
               <a:rPr lang="de-DE" smtClean="0"/>
-              <a:t>14.10.2018</a:t>
+              <a:t>18.10.2018</a:t>
             </a:fld>
             <a:endParaRPr lang="de-DE"/>
           </a:p>
@@ -2554,7 +2557,7 @@
           <a:p>
             <a:fld id="{638941B0-F4D5-4460-BCAD-F7E2B41A8257}" type="datetimeFigureOut">
               <a:rPr lang="de-DE" smtClean="0"/>
-              <a:t>14.10.2018</a:t>
+              <a:t>18.10.2018</a:t>
             </a:fld>
             <a:endParaRPr lang="de-DE"/>
           </a:p>
@@ -3626,6 +3629,919 @@
 </p:sld>
 </file>
 
+<file path=ppt/slides/slide10.xml><?xml version="1.0" encoding="utf-8"?>
+<p:sld xmlns:a="http://schemas.openxmlformats.org/drawingml/2006/main" xmlns:r="http://schemas.openxmlformats.org/officeDocument/2006/relationships" xmlns:p="http://schemas.openxmlformats.org/presentationml/2006/main">
+  <p:cSld>
+    <p:spTree>
+      <p:nvGrpSpPr>
+        <p:cNvPr id="1" name=""/>
+        <p:cNvGrpSpPr/>
+        <p:nvPr/>
+      </p:nvGrpSpPr>
+      <p:grpSpPr>
+        <a:xfrm>
+          <a:off x="0" y="0"/>
+          <a:ext cx="0" cy="0"/>
+          <a:chOff x="0" y="0"/>
+          <a:chExt cx="0" cy="0"/>
+        </a:xfrm>
+      </p:grpSpPr>
+      <p:sp>
+        <p:nvSpPr>
+          <p:cNvPr id="2" name="Title 1">
+            <a:extLst>
+              <a:ext uri="{FF2B5EF4-FFF2-40B4-BE49-F238E27FC236}">
+                <a16:creationId xmlns:a16="http://schemas.microsoft.com/office/drawing/2014/main" id="{78650531-55E3-49D3-BC7F-99F95EA218A2}"/>
+              </a:ext>
+            </a:extLst>
+          </p:cNvPr>
+          <p:cNvSpPr>
+            <a:spLocks noGrp="1"/>
+          </p:cNvSpPr>
+          <p:nvPr>
+            <p:ph type="title"/>
+          </p:nvPr>
+        </p:nvSpPr>
+        <p:spPr/>
+        <p:txBody>
+          <a:bodyPr/>
+          <a:lstStyle/>
+          <a:p>
+            <a:r>
+              <a:rPr lang="en-US">
+                <a:cs typeface="Calibri Light"/>
+              </a:rPr>
+              <a:t>Architecture</a:t>
+            </a:r>
+            <a:endParaRPr lang="fr-FR"/>
+          </a:p>
+        </p:txBody>
+      </p:sp>
+      <p:pic>
+        <p:nvPicPr>
+          <p:cNvPr id="5" name="Image 5" descr="Une image contenant texte&#10;&#10;Description générée avec un niveau de confiance élevé">
+            <a:extLst>
+              <a:ext uri="{FF2B5EF4-FFF2-40B4-BE49-F238E27FC236}">
+                <a16:creationId xmlns:a16="http://schemas.microsoft.com/office/drawing/2014/main" id="{142B216D-98BC-4F39-897C-56C2BEA5CEA1}"/>
+              </a:ext>
+            </a:extLst>
+          </p:cNvPr>
+          <p:cNvPicPr>
+            <a:picLocks noGrp="1" noChangeAspect="1"/>
+          </p:cNvPicPr>
+          <p:nvPr>
+            <p:ph sz="half" idx="2"/>
+          </p:nvPr>
+        </p:nvPicPr>
+        <p:blipFill>
+          <a:blip r:embed="rId2"/>
+          <a:stretch>
+            <a:fillRect/>
+          </a:stretch>
+        </p:blipFill>
+        <p:spPr>
+          <a:xfrm>
+            <a:off x="4184831" y="1324904"/>
+            <a:ext cx="5781040" cy="5413027"/>
+          </a:xfrm>
+          <a:prstGeom prst="rect">
+            <a:avLst/>
+          </a:prstGeom>
+        </p:spPr>
+      </p:pic>
+    </p:spTree>
+    <p:extLst>
+      <p:ext uri="{BB962C8B-B14F-4D97-AF65-F5344CB8AC3E}">
+        <p14:creationId xmlns:p14="http://schemas.microsoft.com/office/powerpoint/2010/main" val="2991003569"/>
+      </p:ext>
+    </p:extLst>
+  </p:cSld>
+  <p:clrMapOvr>
+    <a:masterClrMapping/>
+  </p:clrMapOvr>
+</p:sld>
+</file>
+
+<file path=ppt/slides/slide11.xml><?xml version="1.0" encoding="utf-8"?>
+<p:sld xmlns:a="http://schemas.openxmlformats.org/drawingml/2006/main" xmlns:r="http://schemas.openxmlformats.org/officeDocument/2006/relationships" xmlns:p="http://schemas.openxmlformats.org/presentationml/2006/main">
+  <p:cSld>
+    <p:spTree>
+      <p:nvGrpSpPr>
+        <p:cNvPr id="1" name=""/>
+        <p:cNvGrpSpPr/>
+        <p:nvPr/>
+      </p:nvGrpSpPr>
+      <p:grpSpPr>
+        <a:xfrm>
+          <a:off x="0" y="0"/>
+          <a:ext cx="0" cy="0"/>
+          <a:chOff x="0" y="0"/>
+          <a:chExt cx="0" cy="0"/>
+        </a:xfrm>
+      </p:grpSpPr>
+      <p:sp>
+        <p:nvSpPr>
+          <p:cNvPr id="2" name="Titre 1">
+            <a:extLst>
+              <a:ext uri="{FF2B5EF4-FFF2-40B4-BE49-F238E27FC236}">
+                <a16:creationId xmlns:a16="http://schemas.microsoft.com/office/drawing/2014/main" id="{7C8A0A64-0237-4A27-9EBD-4F068AC3929A}"/>
+              </a:ext>
+            </a:extLst>
+          </p:cNvPr>
+          <p:cNvSpPr>
+            <a:spLocks noGrp="1"/>
+          </p:cNvSpPr>
+          <p:nvPr>
+            <p:ph type="title"/>
+          </p:nvPr>
+        </p:nvSpPr>
+        <p:spPr/>
+        <p:txBody>
+          <a:bodyPr/>
+          <a:lstStyle/>
+          <a:p>
+            <a:r>
+              <a:rPr lang="fr-FR">
+                <a:cs typeface="Calibri Light"/>
+              </a:rPr>
+              <a:t>Ambitions</a:t>
+            </a:r>
+            <a:endParaRPr lang="fr-FR"/>
+          </a:p>
+        </p:txBody>
+      </p:sp>
+      <p:sp>
+        <p:nvSpPr>
+          <p:cNvPr id="4" name="Espace réservé du contenu 3">
+            <a:extLst>
+              <a:ext uri="{FF2B5EF4-FFF2-40B4-BE49-F238E27FC236}">
+                <a16:creationId xmlns:a16="http://schemas.microsoft.com/office/drawing/2014/main" id="{5127A38B-E8AF-4D4A-8AB9-726193B5DD9F}"/>
+              </a:ext>
+            </a:extLst>
+          </p:cNvPr>
+          <p:cNvSpPr>
+            <a:spLocks noGrp="1"/>
+          </p:cNvSpPr>
+          <p:nvPr>
+            <p:ph sz="half" idx="2"/>
+          </p:nvPr>
+        </p:nvSpPr>
+        <p:spPr/>
+        <p:txBody>
+          <a:bodyPr vert="horz" lIns="91440" tIns="45720" rIns="91440" bIns="45720" rtlCol="0" anchor="t">
+            <a:normAutofit/>
+          </a:bodyPr>
+          <a:lstStyle/>
+          <a:p>
+            <a:r>
+              <a:rPr lang="fr-FR">
+                <a:cs typeface="Calibri"/>
+              </a:rPr>
+              <a:t>Monter en compétences sur les technologies utilisées</a:t>
+            </a:r>
+          </a:p>
+          <a:p>
+            <a:endParaRPr lang="fr-FR">
+              <a:cs typeface="Calibri"/>
+            </a:endParaRPr>
+          </a:p>
+          <a:p>
+            <a:r>
+              <a:rPr lang="fr-FR">
+                <a:cs typeface="Calibri"/>
+              </a:rPr>
+              <a:t>Mettre la solution à disposition de tout le monde (open source)</a:t>
+            </a:r>
+          </a:p>
+        </p:txBody>
+      </p:sp>
+      <p:pic>
+        <p:nvPicPr>
+          <p:cNvPr id="8" name="Image 8">
+            <a:extLst>
+              <a:ext uri="{FF2B5EF4-FFF2-40B4-BE49-F238E27FC236}">
+                <a16:creationId xmlns:a16="http://schemas.microsoft.com/office/drawing/2014/main" id="{A6012146-3359-4A07-8761-091D0917F6D9}"/>
+              </a:ext>
+            </a:extLst>
+          </p:cNvPr>
+          <p:cNvPicPr>
+            <a:picLocks noChangeAspect="1"/>
+          </p:cNvPicPr>
+          <p:nvPr/>
+        </p:nvPicPr>
+        <p:blipFill>
+          <a:blip r:embed="rId2"/>
+          <a:stretch>
+            <a:fillRect/>
+          </a:stretch>
+        </p:blipFill>
+        <p:spPr>
+          <a:xfrm>
+            <a:off x="8174657" y="2445834"/>
+            <a:ext cx="2143125" cy="2133600"/>
+          </a:xfrm>
+          <a:prstGeom prst="rect">
+            <a:avLst/>
+          </a:prstGeom>
+        </p:spPr>
+      </p:pic>
+    </p:spTree>
+    <p:extLst>
+      <p:ext uri="{BB962C8B-B14F-4D97-AF65-F5344CB8AC3E}">
+        <p14:creationId xmlns:p14="http://schemas.microsoft.com/office/powerpoint/2010/main" val="1866678013"/>
+      </p:ext>
+    </p:extLst>
+  </p:cSld>
+  <p:clrMapOvr>
+    <a:masterClrMapping/>
+  </p:clrMapOvr>
+</p:sld>
+</file>
+
+<file path=ppt/slides/slide12.xml><?xml version="1.0" encoding="utf-8"?>
+<p:sld xmlns:a="http://schemas.openxmlformats.org/drawingml/2006/main" xmlns:r="http://schemas.openxmlformats.org/officeDocument/2006/relationships" xmlns:p="http://schemas.openxmlformats.org/presentationml/2006/main">
+  <p:cSld>
+    <p:bg>
+      <p:bgPr>
+        <a:solidFill>
+          <a:schemeClr val="bg1"/>
+        </a:solidFill>
+        <a:effectLst/>
+      </p:bgPr>
+    </p:bg>
+    <p:spTree>
+      <p:nvGrpSpPr>
+        <p:cNvPr id="1" name=""/>
+        <p:cNvGrpSpPr/>
+        <p:nvPr/>
+      </p:nvGrpSpPr>
+      <p:grpSpPr>
+        <a:xfrm>
+          <a:off x="0" y="0"/>
+          <a:ext cx="0" cy="0"/>
+          <a:chOff x="0" y="0"/>
+          <a:chExt cx="0" cy="0"/>
+        </a:xfrm>
+      </p:grpSpPr>
+      <p:sp useBgFill="1">
+        <p:nvSpPr>
+          <p:cNvPr id="8" name="Rectangle 7">
+            <a:extLst>
+              <a:ext uri="{FF2B5EF4-FFF2-40B4-BE49-F238E27FC236}">
+                <a16:creationId xmlns:a16="http://schemas.microsoft.com/office/drawing/2014/main" id="{559AE206-7EBA-4D33-8BC9-9D8158553F0E}"/>
+              </a:ext>
+              <a:ext uri="{C183D7F6-B498-43B3-948B-1728B52AA6E4}">
+                <adec:decorative xmlns:adec="http://schemas.microsoft.com/office/drawing/2017/decorative" val="1"/>
+              </a:ext>
+            </a:extLst>
+          </p:cNvPr>
+          <p:cNvSpPr>
+            <a:spLocks noGrp="1" noRot="1" noChangeAspect="1" noMove="1" noResize="1" noEditPoints="1" noAdjustHandles="1" noChangeArrowheads="1" noChangeShapeType="1" noTextEdit="1"/>
+          </p:cNvSpPr>
+          <p:nvPr>
+            <p:extLst>
+              <p:ext uri="{386F3935-93C4-4BCD-93E2-E3B085C9AB24}">
+                <p16:designElem xmlns:p16="http://schemas.microsoft.com/office/powerpoint/2015/main" val="1"/>
+              </p:ext>
+            </p:extLst>
+          </p:nvPr>
+        </p:nvSpPr>
+        <p:spPr>
+          <a:xfrm>
+            <a:off x="0" y="0"/>
+            <a:ext cx="12192000" cy="6858000"/>
+          </a:xfrm>
+          <a:prstGeom prst="rect">
+            <a:avLst/>
+          </a:prstGeom>
+          <a:ln>
+            <a:noFill/>
+          </a:ln>
+        </p:spPr>
+        <p:style>
+          <a:lnRef idx="2">
+            <a:schemeClr val="accent1">
+              <a:shade val="50000"/>
+            </a:schemeClr>
+          </a:lnRef>
+          <a:fillRef idx="1">
+            <a:schemeClr val="accent1"/>
+          </a:fillRef>
+          <a:effectRef idx="0">
+            <a:schemeClr val="accent1"/>
+          </a:effectRef>
+          <a:fontRef idx="minor">
+            <a:schemeClr val="lt1"/>
+          </a:fontRef>
+        </p:style>
+        <p:txBody>
+          <a:bodyPr rtlCol="0" anchor="ctr"/>
+          <a:lstStyle/>
+          <a:p>
+            <a:pPr marL="0" marR="0" lvl="0" indent="0" algn="ctr" defTabSz="914400" rtl="0" eaLnBrk="1" fontAlgn="auto" latinLnBrk="0" hangingPunct="1">
+              <a:lnSpc>
+                <a:spcPct val="100000"/>
+              </a:lnSpc>
+              <a:spcBef>
+                <a:spcPts val="0"/>
+              </a:spcBef>
+              <a:spcAft>
+                <a:spcPts val="0"/>
+              </a:spcAft>
+              <a:buClrTx/>
+              <a:buSzTx/>
+              <a:buFontTx/>
+              <a:buNone/>
+              <a:tabLst/>
+              <a:defRPr/>
+            </a:pPr>
+            <a:endParaRPr kumimoji="0" lang="en-US" sz="1800" b="0" i="0" u="none" strike="noStrike" kern="1200" cap="none" spc="0" normalizeH="0" baseline="0" noProof="0">
+              <a:ln>
+                <a:noFill/>
+              </a:ln>
+              <a:solidFill>
+                <a:prstClr val="white"/>
+              </a:solidFill>
+              <a:effectLst/>
+              <a:uLnTx/>
+              <a:uFillTx/>
+              <a:latin typeface="Calibri" panose="020F0502020204030204"/>
+              <a:ea typeface="+mn-ea"/>
+              <a:cs typeface="+mn-cs"/>
+            </a:endParaRPr>
+          </a:p>
+        </p:txBody>
+      </p:sp>
+      <p:sp>
+        <p:nvSpPr>
+          <p:cNvPr id="2" name="Titre 1"/>
+          <p:cNvSpPr>
+            <a:spLocks noGrp="1"/>
+          </p:cNvSpPr>
+          <p:nvPr>
+            <p:ph type="ctrTitle"/>
+          </p:nvPr>
+        </p:nvSpPr>
+        <p:spPr>
+          <a:xfrm>
+            <a:off x="838199" y="4525347"/>
+            <a:ext cx="6801321" cy="1737360"/>
+          </a:xfrm>
+        </p:spPr>
+        <p:txBody>
+          <a:bodyPr anchor="ctr">
+            <a:normAutofit/>
+          </a:bodyPr>
+          <a:lstStyle/>
+          <a:p>
+            <a:pPr algn="r"/>
+            <a:r>
+              <a:rPr lang="de-DE">
+                <a:cs typeface="Calibri Light"/>
+              </a:rPr>
+              <a:t>EasyLock</a:t>
+            </a:r>
+            <a:endParaRPr lang="de-DE"/>
+          </a:p>
+        </p:txBody>
+      </p:sp>
+      <p:sp>
+        <p:nvSpPr>
+          <p:cNvPr id="3" name="Sous-titre 2"/>
+          <p:cNvSpPr>
+            <a:spLocks noGrp="1"/>
+          </p:cNvSpPr>
+          <p:nvPr>
+            <p:ph type="subTitle" idx="1"/>
+          </p:nvPr>
+        </p:nvSpPr>
+        <p:spPr>
+          <a:xfrm>
+            <a:off x="7961258" y="4525347"/>
+            <a:ext cx="3258675" cy="1737360"/>
+          </a:xfrm>
+        </p:spPr>
+        <p:txBody>
+          <a:bodyPr anchor="ctr">
+            <a:normAutofit/>
+          </a:bodyPr>
+          <a:lstStyle/>
+          <a:p>
+            <a:pPr algn="l"/>
+            <a:r>
+              <a:rPr lang="de-DE">
+                <a:cs typeface="Calibri"/>
+              </a:rPr>
+              <a:t>Projet Libre</a:t>
+            </a:r>
+          </a:p>
+          <a:p>
+            <a:pPr algn="l"/>
+            <a:r>
+              <a:rPr lang="de-DE">
+                <a:cs typeface="Calibri"/>
+              </a:rPr>
+              <a:t>Colin CAZABET</a:t>
+            </a:r>
+          </a:p>
+        </p:txBody>
+      </p:sp>
+      <p:sp>
+        <p:nvSpPr>
+          <p:cNvPr id="10" name="Oval 9">
+            <a:extLst>
+              <a:ext uri="{FF2B5EF4-FFF2-40B4-BE49-F238E27FC236}">
+                <a16:creationId xmlns:a16="http://schemas.microsoft.com/office/drawing/2014/main" id="{6437D937-A7F1-4011-92B4-328E5BE1B166}"/>
+              </a:ext>
+              <a:ext uri="{C183D7F6-B498-43B3-948B-1728B52AA6E4}">
+                <adec:decorative xmlns:adec="http://schemas.microsoft.com/office/drawing/2017/decorative" val="1"/>
+              </a:ext>
+            </a:extLst>
+          </p:cNvPr>
+          <p:cNvSpPr>
+            <a:spLocks noGrp="1" noRot="1" noChangeAspect="1" noMove="1" noResize="1" noEditPoints="1" noAdjustHandles="1" noChangeArrowheads="1" noChangeShapeType="1" noTextEdit="1"/>
+          </p:cNvSpPr>
+          <p:nvPr>
+            <p:extLst>
+              <p:ext uri="{386F3935-93C4-4BCD-93E2-E3B085C9AB24}">
+                <p16:designElem xmlns:p16="http://schemas.microsoft.com/office/powerpoint/2015/main" val="1"/>
+              </p:ext>
+            </p:extLst>
+          </p:nvPr>
+        </p:nvSpPr>
+        <p:spPr>
+          <a:xfrm>
+            <a:off x="588567" y="620480"/>
+            <a:ext cx="2243800" cy="2243796"/>
+          </a:xfrm>
+          <a:prstGeom prst="ellipse">
+            <a:avLst/>
+          </a:prstGeom>
+          <a:solidFill>
+            <a:schemeClr val="accent5"/>
+          </a:solidFill>
+          <a:ln>
+            <a:noFill/>
+          </a:ln>
+        </p:spPr>
+        <p:style>
+          <a:lnRef idx="2">
+            <a:schemeClr val="accent1">
+              <a:shade val="50000"/>
+            </a:schemeClr>
+          </a:lnRef>
+          <a:fillRef idx="1">
+            <a:schemeClr val="accent1"/>
+          </a:fillRef>
+          <a:effectRef idx="0">
+            <a:schemeClr val="accent1"/>
+          </a:effectRef>
+          <a:fontRef idx="minor">
+            <a:schemeClr val="lt1"/>
+          </a:fontRef>
+        </p:style>
+        <p:txBody>
+          <a:bodyPr rtlCol="0" anchor="ctr"/>
+          <a:lstStyle/>
+          <a:p>
+            <a:pPr marL="0" marR="0" lvl="0" indent="0" algn="ctr" defTabSz="914400" rtl="0" eaLnBrk="1" fontAlgn="auto" latinLnBrk="0" hangingPunct="1">
+              <a:lnSpc>
+                <a:spcPct val="100000"/>
+              </a:lnSpc>
+              <a:spcBef>
+                <a:spcPts val="0"/>
+              </a:spcBef>
+              <a:spcAft>
+                <a:spcPts val="0"/>
+              </a:spcAft>
+              <a:buClrTx/>
+              <a:buSzTx/>
+              <a:buFontTx/>
+              <a:buNone/>
+              <a:tabLst/>
+              <a:defRPr/>
+            </a:pPr>
+            <a:endParaRPr kumimoji="0" lang="en-US" sz="1800" b="0" i="0" u="none" strike="noStrike" kern="1200" cap="none" spc="0" normalizeH="0" baseline="0" noProof="0">
+              <a:ln>
+                <a:noFill/>
+              </a:ln>
+              <a:solidFill>
+                <a:prstClr val="white"/>
+              </a:solidFill>
+              <a:effectLst/>
+              <a:uLnTx/>
+              <a:uFillTx/>
+              <a:latin typeface="Calibri" panose="020F0502020204030204"/>
+              <a:ea typeface="+mn-ea"/>
+              <a:cs typeface="+mn-cs"/>
+            </a:endParaRPr>
+          </a:p>
+        </p:txBody>
+      </p:sp>
+      <p:sp>
+        <p:nvSpPr>
+          <p:cNvPr id="12" name="Oval 11">
+            <a:extLst>
+              <a:ext uri="{FF2B5EF4-FFF2-40B4-BE49-F238E27FC236}">
+                <a16:creationId xmlns:a16="http://schemas.microsoft.com/office/drawing/2014/main" id="{B672F332-AF08-46C6-94F0-77684310D7B7}"/>
+              </a:ext>
+              <a:ext uri="{C183D7F6-B498-43B3-948B-1728B52AA6E4}">
+                <adec:decorative xmlns:adec="http://schemas.microsoft.com/office/drawing/2017/decorative" val="1"/>
+              </a:ext>
+            </a:extLst>
+          </p:cNvPr>
+          <p:cNvSpPr>
+            <a:spLocks noGrp="1" noRot="1" noChangeAspect="1" noMove="1" noResize="1" noEditPoints="1" noAdjustHandles="1" noChangeArrowheads="1" noChangeShapeType="1" noTextEdit="1"/>
+          </p:cNvSpPr>
+          <p:nvPr>
+            <p:extLst>
+              <p:ext uri="{386F3935-93C4-4BCD-93E2-E3B085C9AB24}">
+                <p16:designElem xmlns:p16="http://schemas.microsoft.com/office/powerpoint/2015/main" val="1"/>
+              </p:ext>
+            </p:extLst>
+          </p:nvPr>
+        </p:nvSpPr>
+        <p:spPr>
+          <a:xfrm>
+            <a:off x="3395001" y="2466604"/>
+            <a:ext cx="962395" cy="962395"/>
+          </a:xfrm>
+          <a:prstGeom prst="ellipse">
+            <a:avLst/>
+          </a:prstGeom>
+          <a:solidFill>
+            <a:schemeClr val="accent4"/>
+          </a:solidFill>
+          <a:ln>
+            <a:noFill/>
+          </a:ln>
+        </p:spPr>
+        <p:style>
+          <a:lnRef idx="2">
+            <a:schemeClr val="accent1">
+              <a:shade val="50000"/>
+            </a:schemeClr>
+          </a:lnRef>
+          <a:fillRef idx="1">
+            <a:schemeClr val="accent1"/>
+          </a:fillRef>
+          <a:effectRef idx="0">
+            <a:schemeClr val="accent1"/>
+          </a:effectRef>
+          <a:fontRef idx="minor">
+            <a:schemeClr val="lt1"/>
+          </a:fontRef>
+        </p:style>
+        <p:txBody>
+          <a:bodyPr rtlCol="0" anchor="ctr"/>
+          <a:lstStyle/>
+          <a:p>
+            <a:pPr marL="0" marR="0" lvl="0" indent="0" algn="ctr" defTabSz="914400" rtl="0" eaLnBrk="1" fontAlgn="auto" latinLnBrk="0" hangingPunct="1">
+              <a:lnSpc>
+                <a:spcPct val="100000"/>
+              </a:lnSpc>
+              <a:spcBef>
+                <a:spcPts val="0"/>
+              </a:spcBef>
+              <a:spcAft>
+                <a:spcPts val="0"/>
+              </a:spcAft>
+              <a:buClrTx/>
+              <a:buSzTx/>
+              <a:buFontTx/>
+              <a:buNone/>
+              <a:tabLst/>
+              <a:defRPr/>
+            </a:pPr>
+            <a:endParaRPr kumimoji="0" lang="en-US" sz="1800" b="0" i="0" u="none" strike="noStrike" kern="1200" cap="none" spc="0" normalizeH="0" baseline="0" noProof="0">
+              <a:ln>
+                <a:noFill/>
+              </a:ln>
+              <a:solidFill>
+                <a:prstClr val="white"/>
+              </a:solidFill>
+              <a:effectLst/>
+              <a:uLnTx/>
+              <a:uFillTx/>
+              <a:latin typeface="Calibri" panose="020F0502020204030204"/>
+              <a:ea typeface="+mn-ea"/>
+              <a:cs typeface="+mn-cs"/>
+            </a:endParaRPr>
+          </a:p>
+        </p:txBody>
+      </p:sp>
+      <p:sp>
+        <p:nvSpPr>
+          <p:cNvPr id="14" name="Oval 13">
+            <a:extLst>
+              <a:ext uri="{FF2B5EF4-FFF2-40B4-BE49-F238E27FC236}">
+                <a16:creationId xmlns:a16="http://schemas.microsoft.com/office/drawing/2014/main" id="{34244EF8-D73A-40E1-BE73-D46E6B4B04ED}"/>
+              </a:ext>
+              <a:ext uri="{C183D7F6-B498-43B3-948B-1728B52AA6E4}">
+                <adec:decorative xmlns:adec="http://schemas.microsoft.com/office/drawing/2017/decorative" val="1"/>
+              </a:ext>
+            </a:extLst>
+          </p:cNvPr>
+          <p:cNvSpPr>
+            <a:spLocks noGrp="1" noRot="1" noChangeAspect="1" noMove="1" noResize="1" noEditPoints="1" noAdjustHandles="1" noChangeArrowheads="1" noChangeShapeType="1" noTextEdit="1"/>
+          </p:cNvSpPr>
+          <p:nvPr>
+            <p:extLst>
+              <p:ext uri="{386F3935-93C4-4BCD-93E2-E3B085C9AB24}">
+                <p16:designElem xmlns:p16="http://schemas.microsoft.com/office/powerpoint/2015/main" val="1"/>
+              </p:ext>
+            </p:extLst>
+          </p:nvPr>
+        </p:nvSpPr>
+        <p:spPr>
+          <a:xfrm>
+            <a:off x="5125829" y="2327988"/>
+            <a:ext cx="293695" cy="293695"/>
+          </a:xfrm>
+          <a:prstGeom prst="ellipse">
+            <a:avLst/>
+          </a:prstGeom>
+          <a:solidFill>
+            <a:schemeClr val="accent3"/>
+          </a:solidFill>
+          <a:ln>
+            <a:noFill/>
+          </a:ln>
+        </p:spPr>
+        <p:style>
+          <a:lnRef idx="2">
+            <a:schemeClr val="accent1">
+              <a:shade val="50000"/>
+            </a:schemeClr>
+          </a:lnRef>
+          <a:fillRef idx="1">
+            <a:schemeClr val="accent1"/>
+          </a:fillRef>
+          <a:effectRef idx="0">
+            <a:schemeClr val="accent1"/>
+          </a:effectRef>
+          <a:fontRef idx="minor">
+            <a:schemeClr val="lt1"/>
+          </a:fontRef>
+        </p:style>
+        <p:txBody>
+          <a:bodyPr rtlCol="0" anchor="ctr"/>
+          <a:lstStyle/>
+          <a:p>
+            <a:pPr marL="0" marR="0" lvl="0" indent="0" algn="ctr" defTabSz="914400" rtl="0" eaLnBrk="1" fontAlgn="auto" latinLnBrk="0" hangingPunct="1">
+              <a:lnSpc>
+                <a:spcPct val="100000"/>
+              </a:lnSpc>
+              <a:spcBef>
+                <a:spcPts val="0"/>
+              </a:spcBef>
+              <a:spcAft>
+                <a:spcPts val="0"/>
+              </a:spcAft>
+              <a:buClrTx/>
+              <a:buSzTx/>
+              <a:buFontTx/>
+              <a:buNone/>
+              <a:tabLst/>
+              <a:defRPr/>
+            </a:pPr>
+            <a:endParaRPr kumimoji="0" lang="en-US" sz="1800" b="0" i="0" u="none" strike="noStrike" kern="1200" cap="none" spc="0" normalizeH="0" baseline="0" noProof="0">
+              <a:ln>
+                <a:noFill/>
+              </a:ln>
+              <a:solidFill>
+                <a:prstClr val="white"/>
+              </a:solidFill>
+              <a:effectLst/>
+              <a:uLnTx/>
+              <a:uFillTx/>
+              <a:latin typeface="Calibri" panose="020F0502020204030204"/>
+              <a:ea typeface="+mn-ea"/>
+              <a:cs typeface="+mn-cs"/>
+            </a:endParaRPr>
+          </a:p>
+        </p:txBody>
+      </p:sp>
+      <p:sp>
+        <p:nvSpPr>
+          <p:cNvPr id="16" name="Freeform: Shape 15">
+            <a:extLst>
+              <a:ext uri="{FF2B5EF4-FFF2-40B4-BE49-F238E27FC236}">
+                <a16:creationId xmlns:a16="http://schemas.microsoft.com/office/drawing/2014/main" id="{AB84D7E8-4ECB-42D7-ADBF-01689B0F24AE}"/>
+              </a:ext>
+              <a:ext uri="{C183D7F6-B498-43B3-948B-1728B52AA6E4}">
+                <adec:decorative xmlns:adec="http://schemas.microsoft.com/office/drawing/2017/decorative" val="1"/>
+              </a:ext>
+            </a:extLst>
+          </p:cNvPr>
+          <p:cNvSpPr>
+            <a:spLocks noGrp="1" noRot="1" noChangeAspect="1" noMove="1" noResize="1" noEditPoints="1" noAdjustHandles="1" noChangeArrowheads="1" noChangeShapeType="1" noTextEdit="1"/>
+          </p:cNvSpPr>
+          <p:nvPr>
+            <p:extLst>
+              <p:ext uri="{386F3935-93C4-4BCD-93E2-E3B085C9AB24}">
+                <p16:designElem xmlns:p16="http://schemas.microsoft.com/office/powerpoint/2015/main" val="1"/>
+              </p:ext>
+            </p:extLst>
+          </p:nvPr>
+        </p:nvSpPr>
+        <p:spPr>
+          <a:xfrm>
+            <a:off x="6492113" y="0"/>
+            <a:ext cx="5699887" cy="4059244"/>
+          </a:xfrm>
+          <a:custGeom>
+            <a:avLst/>
+            <a:gdLst>
+              <a:gd name="connsiteX0" fmla="*/ 0 w 5699887"/>
+              <a:gd name="connsiteY0" fmla="*/ 0 h 4059244"/>
+              <a:gd name="connsiteX1" fmla="*/ 5699887 w 5699887"/>
+              <a:gd name="connsiteY1" fmla="*/ 0 h 4059244"/>
+              <a:gd name="connsiteX2" fmla="*/ 5699887 w 5699887"/>
+              <a:gd name="connsiteY2" fmla="*/ 3944096 h 4059244"/>
+              <a:gd name="connsiteX3" fmla="*/ 5525775 w 5699887"/>
+              <a:gd name="connsiteY3" fmla="*/ 3980429 h 4059244"/>
+              <a:gd name="connsiteX4" fmla="*/ 4663256 w 5699887"/>
+              <a:gd name="connsiteY4" fmla="*/ 4059244 h 4059244"/>
+              <a:gd name="connsiteX5" fmla="*/ 8566 w 5699887"/>
+              <a:gd name="connsiteY5" fmla="*/ 67422 h 4059244"/>
+            </a:gdLst>
+            <a:ahLst/>
+            <a:cxnLst>
+              <a:cxn ang="0">
+                <a:pos x="connsiteX0" y="connsiteY0"/>
+              </a:cxn>
+              <a:cxn ang="0">
+                <a:pos x="connsiteX1" y="connsiteY1"/>
+              </a:cxn>
+              <a:cxn ang="0">
+                <a:pos x="connsiteX2" y="connsiteY2"/>
+              </a:cxn>
+              <a:cxn ang="0">
+                <a:pos x="connsiteX3" y="connsiteY3"/>
+              </a:cxn>
+              <a:cxn ang="0">
+                <a:pos x="connsiteX4" y="connsiteY4"/>
+              </a:cxn>
+              <a:cxn ang="0">
+                <a:pos x="connsiteX5" y="connsiteY5"/>
+              </a:cxn>
+            </a:cxnLst>
+            <a:rect l="l" t="t" r="r" b="b"/>
+            <a:pathLst>
+              <a:path w="5699887" h="4059244">
+                <a:moveTo>
+                  <a:pt x="0" y="0"/>
+                </a:moveTo>
+                <a:lnTo>
+                  <a:pt x="5699887" y="0"/>
+                </a:lnTo>
+                <a:lnTo>
+                  <a:pt x="5699887" y="3944096"/>
+                </a:lnTo>
+                <a:lnTo>
+                  <a:pt x="5525775" y="3980429"/>
+                </a:lnTo>
+                <a:cubicBezTo>
+                  <a:pt x="5246154" y="4032190"/>
+                  <a:pt x="4957865" y="4059244"/>
+                  <a:pt x="4663256" y="4059244"/>
+                </a:cubicBezTo>
+                <a:cubicBezTo>
+                  <a:pt x="2306390" y="4059244"/>
+                  <a:pt x="353936" y="2327747"/>
+                  <a:pt x="8566" y="67422"/>
+                </a:cubicBezTo>
+                <a:close/>
+              </a:path>
+            </a:pathLst>
+          </a:custGeom>
+          <a:solidFill>
+            <a:srgbClr val="595959"/>
+          </a:solidFill>
+          <a:ln>
+            <a:noFill/>
+          </a:ln>
+        </p:spPr>
+        <p:style>
+          <a:lnRef idx="2">
+            <a:schemeClr val="accent1">
+              <a:shade val="50000"/>
+            </a:schemeClr>
+          </a:lnRef>
+          <a:fillRef idx="1">
+            <a:schemeClr val="accent1"/>
+          </a:fillRef>
+          <a:effectRef idx="0">
+            <a:schemeClr val="accent1"/>
+          </a:effectRef>
+          <a:fontRef idx="minor">
+            <a:schemeClr val="lt1"/>
+          </a:fontRef>
+        </p:style>
+        <p:txBody>
+          <a:bodyPr rtlCol="0" anchor="ctr"/>
+          <a:lstStyle/>
+          <a:p>
+            <a:pPr marL="0" marR="0" lvl="0" indent="0" algn="ctr" defTabSz="914400" rtl="0" eaLnBrk="1" fontAlgn="auto" latinLnBrk="0" hangingPunct="1">
+              <a:lnSpc>
+                <a:spcPct val="100000"/>
+              </a:lnSpc>
+              <a:spcBef>
+                <a:spcPts val="0"/>
+              </a:spcBef>
+              <a:spcAft>
+                <a:spcPts val="0"/>
+              </a:spcAft>
+              <a:buClrTx/>
+              <a:buSzTx/>
+              <a:buFontTx/>
+              <a:buNone/>
+              <a:tabLst/>
+              <a:defRPr/>
+            </a:pPr>
+            <a:endParaRPr kumimoji="0" lang="en-US" sz="1800" b="0" i="0" u="none" strike="noStrike" kern="1200" cap="none" spc="0" normalizeH="0" baseline="0" noProof="0">
+              <a:ln>
+                <a:noFill/>
+              </a:ln>
+              <a:solidFill>
+                <a:prstClr val="white"/>
+              </a:solidFill>
+              <a:effectLst/>
+              <a:uLnTx/>
+              <a:uFillTx/>
+              <a:latin typeface="Calibri" panose="020F0502020204030204"/>
+              <a:ea typeface="+mn-ea"/>
+              <a:cs typeface="+mn-cs"/>
+            </a:endParaRPr>
+          </a:p>
+        </p:txBody>
+      </p:sp>
+      <p:cxnSp>
+        <p:nvCxnSpPr>
+          <p:cNvPr id="18" name="Straight Connector 17">
+            <a:extLst>
+              <a:ext uri="{FF2B5EF4-FFF2-40B4-BE49-F238E27FC236}">
+                <a16:creationId xmlns:a16="http://schemas.microsoft.com/office/drawing/2014/main" id="{9E8E38ED-369A-44C2-B635-0BED0E48A6E8}"/>
+              </a:ext>
+              <a:ext uri="{C183D7F6-B498-43B3-948B-1728B52AA6E4}">
+                <adec:decorative xmlns:adec="http://schemas.microsoft.com/office/drawing/2017/decorative" val="1"/>
+              </a:ext>
+            </a:extLst>
+          </p:cNvPr>
+          <p:cNvCxnSpPr>
+            <a:cxnSpLocks noGrp="1" noRot="1" noChangeAspect="1" noMove="1" noResize="1" noEditPoints="1" noAdjustHandles="1" noChangeArrowheads="1" noChangeShapeType="1"/>
+          </p:cNvCxnSpPr>
+          <p:nvPr>
+            <p:extLst>
+              <p:ext uri="{386F3935-93C4-4BCD-93E2-E3B085C9AB24}">
+                <p16:designElem xmlns:p16="http://schemas.microsoft.com/office/powerpoint/2015/main" val="1"/>
+              </p:ext>
+            </p:extLst>
+          </p:nvPr>
+        </p:nvCxnSpPr>
+        <p:spPr>
+          <a:xfrm>
+            <a:off x="7800392" y="4525347"/>
+            <a:ext cx="0" cy="1737360"/>
+          </a:xfrm>
+          <a:prstGeom prst="line">
+            <a:avLst/>
+          </a:prstGeom>
+          <a:ln w="19050" cap="sq">
+            <a:solidFill>
+              <a:schemeClr val="tx1"/>
+            </a:solidFill>
+          </a:ln>
+        </p:spPr>
+        <p:style>
+          <a:lnRef idx="1">
+            <a:schemeClr val="accent1"/>
+          </a:lnRef>
+          <a:fillRef idx="0">
+            <a:schemeClr val="accent1"/>
+          </a:fillRef>
+          <a:effectRef idx="0">
+            <a:schemeClr val="accent1"/>
+          </a:effectRef>
+          <a:fontRef idx="minor">
+            <a:schemeClr val="tx1"/>
+          </a:fontRef>
+        </p:style>
+      </p:cxnSp>
+    </p:spTree>
+    <p:extLst>
+      <p:ext uri="{BB962C8B-B14F-4D97-AF65-F5344CB8AC3E}">
+        <p14:creationId xmlns:p14="http://schemas.microsoft.com/office/powerpoint/2010/main" val="4141796255"/>
+      </p:ext>
+    </p:extLst>
+  </p:cSld>
+  <p:clrMapOvr>
+    <a:masterClrMapping/>
+  </p:clrMapOvr>
+</p:sld>
+</file>
+
 <file path=ppt/slides/slide2.xml><?xml version="1.0" encoding="utf-8"?>
 <p:sld xmlns:a="http://schemas.openxmlformats.org/drawingml/2006/main" xmlns:r="http://schemas.openxmlformats.org/officeDocument/2006/relationships" xmlns:p="http://schemas.openxmlformats.org/presentationml/2006/main">
   <p:cSld>
@@ -4045,76 +4961,76 @@
           </a:lstStyle>
           <a:p>
             <a:r>
-              <a:rPr lang="en-US" dirty="0">
+              <a:rPr lang="en-US">
                 <a:cs typeface="Calibri"/>
               </a:rPr>
               <a:t>On </a:t>
             </a:r>
             <a:r>
-              <a:rPr lang="en-US" dirty="0" err="1">
+              <a:rPr lang="en-US" err="1">
                 <a:cs typeface="Calibri"/>
               </a:rPr>
               <a:t>remplace</a:t>
             </a:r>
             <a:r>
-              <a:rPr lang="en-US" dirty="0">
+              <a:rPr lang="en-US">
                 <a:cs typeface="Calibri"/>
               </a:rPr>
               <a:t> la </a:t>
             </a:r>
             <a:r>
-              <a:rPr lang="en-US" dirty="0" err="1">
+              <a:rPr lang="en-US" err="1">
                 <a:cs typeface="Calibri"/>
               </a:rPr>
               <a:t>clé</a:t>
             </a:r>
             <a:r>
-              <a:rPr lang="en-US" dirty="0">
+              <a:rPr lang="en-US">
                 <a:cs typeface="Calibri"/>
               </a:rPr>
               <a:t> par </a:t>
             </a:r>
             <a:r>
-              <a:rPr lang="en-US" dirty="0" err="1">
+              <a:rPr lang="en-US" err="1">
                 <a:cs typeface="Calibri"/>
               </a:rPr>
               <a:t>une</a:t>
             </a:r>
             <a:r>
-              <a:rPr lang="en-US" dirty="0">
+              <a:rPr lang="en-US">
                 <a:cs typeface="Calibri"/>
               </a:rPr>
               <a:t> </a:t>
             </a:r>
             <a:r>
-              <a:rPr lang="en-US" dirty="0" err="1">
+              <a:rPr lang="en-US" err="1">
                 <a:cs typeface="Calibri"/>
               </a:rPr>
               <a:t>caméra</a:t>
             </a:r>
             <a:r>
-              <a:rPr lang="en-US" dirty="0">
+              <a:rPr lang="en-US">
                 <a:cs typeface="Calibri"/>
               </a:rPr>
               <a:t> </a:t>
             </a:r>
             <a:r>
-              <a:rPr lang="en-US" dirty="0" err="1">
+              <a:rPr lang="en-US" err="1">
                 <a:cs typeface="Calibri"/>
               </a:rPr>
               <a:t>reliée</a:t>
             </a:r>
             <a:r>
-              <a:rPr lang="en-US" dirty="0">
+              <a:rPr lang="en-US">
                 <a:cs typeface="Calibri"/>
               </a:rPr>
               <a:t> à la </a:t>
             </a:r>
             <a:r>
-              <a:rPr lang="en-US" dirty="0" err="1">
+              <a:rPr lang="en-US" err="1">
                 <a:cs typeface="Calibri"/>
               </a:rPr>
-              <a:t>serure</a:t>
+              <a:t>serrure</a:t>
             </a:r>
           </a:p>
           <a:p>
@@ -4124,124 +5040,148 @@
           </a:p>
           <a:p>
             <a:r>
-              <a:rPr lang="en-US" dirty="0">
+              <a:rPr lang="en-US">
                 <a:cs typeface="Calibri"/>
               </a:rPr>
-              <a:t>Une </a:t>
-            </a:r>
-            <a:r>
-              <a:rPr lang="en-US" dirty="0" err="1">
+              <a:t>On </a:t>
+            </a:r>
+            <a:r>
+              <a:rPr lang="en-US" err="1">
                 <a:cs typeface="Calibri"/>
               </a:rPr>
+              <a:t>crée</a:t>
+            </a:r>
+            <a:r>
+              <a:rPr lang="en-US">
+                <a:cs typeface="Calibri"/>
+              </a:rPr>
+              <a:t> </a:t>
+            </a:r>
+            <a:r>
+              <a:rPr lang="en-US" err="1">
+                <a:cs typeface="Calibri"/>
+              </a:rPr>
+              <a:t>une</a:t>
+            </a:r>
+            <a:r>
+              <a:rPr lang="en-US">
+                <a:cs typeface="Calibri"/>
+              </a:rPr>
+              <a:t> </a:t>
+            </a:r>
+            <a:r>
+              <a:rPr lang="en-US" err="1">
+                <a:cs typeface="Calibri"/>
+              </a:rPr>
               <a:t>plateforme</a:t>
             </a:r>
             <a:r>
-              <a:rPr lang="en-US" dirty="0">
+              <a:rPr lang="en-US">
                 <a:cs typeface="Calibri"/>
               </a:rPr>
               <a:t> en </a:t>
             </a:r>
             <a:r>
-              <a:rPr lang="en-US" dirty="0" err="1">
+              <a:rPr lang="en-US" err="1">
                 <a:cs typeface="Calibri"/>
               </a:rPr>
               <a:t>ligne</a:t>
             </a:r>
             <a:r>
-              <a:rPr lang="en-US" dirty="0">
+              <a:rPr lang="en-US">
                 <a:cs typeface="Calibri"/>
               </a:rPr>
               <a:t> pour </a:t>
             </a:r>
             <a:r>
-              <a:rPr lang="en-US" dirty="0" err="1">
+              <a:rPr lang="en-US" err="1">
                 <a:cs typeface="Calibri"/>
               </a:rPr>
               <a:t>gérer</a:t>
             </a:r>
             <a:r>
-              <a:rPr lang="en-US" dirty="0">
+              <a:rPr lang="en-US">
                 <a:cs typeface="Calibri"/>
               </a:rPr>
               <a:t> </a:t>
             </a:r>
             <a:r>
-              <a:rPr lang="en-US" dirty="0" err="1">
+              <a:rPr lang="en-US" err="1">
                 <a:cs typeface="Calibri"/>
               </a:rPr>
-              <a:t>mes</a:t>
-            </a:r>
-            <a:r>
-              <a:rPr lang="en-US" dirty="0">
+              <a:t>ses</a:t>
+            </a:r>
+            <a:r>
+              <a:rPr lang="en-US">
                 <a:cs typeface="Calibri"/>
               </a:rPr>
               <a:t> </a:t>
             </a:r>
             <a:r>
-              <a:rPr lang="en-US" dirty="0" err="1">
+              <a:rPr lang="en-US" err="1">
                 <a:cs typeface="Calibri"/>
               </a:rPr>
               <a:t>clés</a:t>
             </a:r>
             <a:r>
-              <a:rPr lang="en-US" dirty="0">
+              <a:rPr lang="en-US">
                 <a:cs typeface="Calibri"/>
               </a:rPr>
               <a:t> </a:t>
             </a:r>
             <a:r>
-              <a:rPr lang="en-US" dirty="0" err="1">
+              <a:rPr lang="en-US" err="1">
                 <a:cs typeface="Calibri"/>
               </a:rPr>
               <a:t>virtuelles</a:t>
             </a:r>
             <a:r>
-              <a:rPr lang="en-US" dirty="0">
+              <a:rPr lang="en-US">
                 <a:cs typeface="Calibri"/>
               </a:rPr>
               <a:t> et </a:t>
             </a:r>
             <a:r>
-              <a:rPr lang="en-US" dirty="0" err="1">
+              <a:rPr lang="en-US" err="1">
                 <a:cs typeface="Calibri"/>
               </a:rPr>
               <a:t>sélectionner</a:t>
             </a:r>
             <a:r>
-              <a:rPr lang="en-US" dirty="0">
+              <a:rPr lang="en-US">
                 <a:cs typeface="Calibri"/>
               </a:rPr>
               <a:t> qui </a:t>
             </a:r>
             <a:r>
-              <a:rPr lang="en-US" dirty="0" err="1">
+              <a:rPr lang="en-US" err="1">
                 <a:cs typeface="Calibri"/>
               </a:rPr>
               <a:t>peut</a:t>
             </a:r>
             <a:r>
-              <a:rPr lang="en-US" dirty="0">
+              <a:rPr lang="en-US">
                 <a:cs typeface="Calibri"/>
               </a:rPr>
               <a:t> </a:t>
             </a:r>
             <a:r>
-              <a:rPr lang="en-US" dirty="0" err="1">
+              <a:rPr lang="en-US" err="1">
                 <a:cs typeface="Calibri"/>
               </a:rPr>
               <a:t>entrer</a:t>
             </a:r>
             <a:r>
-              <a:rPr lang="en-US" dirty="0">
+              <a:rPr lang="en-US">
                 <a:cs typeface="Calibri"/>
               </a:rPr>
               <a:t> chez </a:t>
             </a:r>
             <a:r>
-              <a:rPr lang="en-US" dirty="0" err="1">
+              <a:rPr lang="en-US" err="1">
                 <a:cs typeface="Calibri"/>
               </a:rPr>
-              <a:t>moi</a:t>
+              <a:t>soi</a:t>
             </a:r>
           </a:p>
         </p:txBody>
@@ -4278,10 +5218,10 @@
       </p:grpSpPr>
       <p:sp>
         <p:nvSpPr>
-          <p:cNvPr id="2" name="Title 1">
+          <p:cNvPr id="2" name="Titre 1">
             <a:extLst>
               <a:ext uri="{FF2B5EF4-FFF2-40B4-BE49-F238E27FC236}">
-                <a16:creationId xmlns:a16="http://schemas.microsoft.com/office/drawing/2014/main" id="{92459656-C58C-47C2-A9EB-25E59C788FED}"/>
+                <a16:creationId xmlns:a16="http://schemas.microsoft.com/office/drawing/2014/main" id="{7A31BED3-BA4B-4F2C-9EDA-C753F091C4C5}"/>
               </a:ext>
             </a:extLst>
           </p:cNvPr>
@@ -4298,21 +5238,21 @@
           <a:lstStyle/>
           <a:p>
             <a:r>
-              <a:rPr lang="en-US">
+              <a:rPr lang="fr-FR">
                 <a:cs typeface="Calibri Light"/>
               </a:rPr>
-              <a:t>Cas d'usage</a:t>
-            </a:r>
-            <a:endParaRPr lang="en-US"/>
-          </a:p>
-        </p:txBody>
-      </p:sp>
-      <p:sp>
-        <p:nvSpPr>
-          <p:cNvPr id="3" name="Content Placeholder 2">
+              <a:t>Comment ça marche ?</a:t>
+            </a:r>
+            <a:endParaRPr lang="fr-FR"/>
+          </a:p>
+        </p:txBody>
+      </p:sp>
+      <p:sp>
+        <p:nvSpPr>
+          <p:cNvPr id="4" name="Espace réservé du contenu 3">
             <a:extLst>
               <a:ext uri="{FF2B5EF4-FFF2-40B4-BE49-F238E27FC236}">
-                <a16:creationId xmlns:a16="http://schemas.microsoft.com/office/drawing/2014/main" id="{05697200-2FC8-48F8-8EEE-9A064E39A016}"/>
+                <a16:creationId xmlns:a16="http://schemas.microsoft.com/office/drawing/2014/main" id="{035F60B4-BC9B-49FB-8503-0D281BB8225F}"/>
               </a:ext>
             </a:extLst>
           </p:cNvPr>
@@ -4320,15 +5260,10 @@
             <a:spLocks noGrp="1"/>
           </p:cNvSpPr>
           <p:nvPr>
-            <p:ph sz="half" idx="1"/>
-          </p:nvPr>
-        </p:nvSpPr>
-        <p:spPr>
-          <a:xfrm>
-            <a:off x="674914" y="2850696"/>
-            <a:ext cx="5181600" cy="4351338"/>
-          </a:xfrm>
-        </p:spPr>
+            <p:ph sz="half" idx="2"/>
+          </p:nvPr>
+        </p:nvSpPr>
+        <p:spPr/>
         <p:txBody>
           <a:bodyPr vert="horz" lIns="91440" tIns="45720" rIns="91440" bIns="45720" rtlCol="0" anchor="t">
             <a:normAutofit/>
@@ -4336,225 +5271,41 @@
           <a:lstStyle/>
           <a:p>
             <a:r>
-              <a:rPr lang="en-US">
+              <a:rPr lang="fr-FR" dirty="0">
                 <a:cs typeface="Calibri"/>
               </a:rPr>
-              <a:t>Je </a:t>
-            </a:r>
-            <a:r>
-              <a:rPr lang="en-US" err="1">
-                <a:cs typeface="Calibri"/>
-              </a:rPr>
-              <a:t>prête</a:t>
-            </a:r>
-            <a:r>
-              <a:rPr lang="en-US">
-                <a:cs typeface="Calibri"/>
-              </a:rPr>
-              <a:t> mon </a:t>
-            </a:r>
-            <a:r>
-              <a:rPr lang="en-US" err="1">
-                <a:cs typeface="Calibri"/>
-              </a:rPr>
-              <a:t>appartement</a:t>
-            </a:r>
-            <a:r>
-              <a:rPr lang="en-US">
-                <a:cs typeface="Calibri"/>
-              </a:rPr>
-              <a:t> à un </a:t>
-            </a:r>
-            <a:r>
-              <a:rPr lang="en-US" err="1">
-                <a:cs typeface="Calibri"/>
-              </a:rPr>
-              <a:t>ami</a:t>
-            </a:r>
-            <a:r>
-              <a:rPr lang="en-US">
-                <a:cs typeface="Calibri"/>
-              </a:rPr>
-              <a:t> pendant </a:t>
-            </a:r>
-            <a:r>
-              <a:rPr lang="en-US" err="1">
-                <a:cs typeface="Calibri"/>
-              </a:rPr>
-              <a:t>une</a:t>
-            </a:r>
-            <a:r>
-              <a:rPr lang="en-US">
-                <a:cs typeface="Calibri"/>
-              </a:rPr>
-              <a:t> </a:t>
-            </a:r>
-            <a:r>
-              <a:rPr lang="en-US" err="1">
-                <a:cs typeface="Calibri"/>
-              </a:rPr>
-              <a:t>semaine</a:t>
-            </a:r>
-            <a:r>
-              <a:rPr lang="en-US">
-                <a:cs typeface="Calibri"/>
-              </a:rPr>
-              <a:t> </a:t>
-            </a:r>
-            <a:r>
-              <a:rPr lang="en-US" err="1">
-                <a:cs typeface="Calibri"/>
-              </a:rPr>
-              <a:t>mais</a:t>
-            </a:r>
-            <a:r>
-              <a:rPr lang="en-US">
-                <a:cs typeface="Calibri"/>
-              </a:rPr>
-              <a:t> je </a:t>
-            </a:r>
-            <a:r>
-              <a:rPr lang="en-US" err="1">
-                <a:cs typeface="Calibri"/>
-              </a:rPr>
-              <a:t>n'ai</a:t>
-            </a:r>
-            <a:r>
-              <a:rPr lang="en-US">
-                <a:cs typeface="Calibri"/>
-              </a:rPr>
-              <a:t> </a:t>
-            </a:r>
-            <a:r>
-              <a:rPr lang="en-US" err="1">
-                <a:cs typeface="Calibri"/>
-              </a:rPr>
-              <a:t>qu'une</a:t>
-            </a:r>
-            <a:r>
-              <a:rPr lang="en-US">
-                <a:cs typeface="Calibri"/>
-              </a:rPr>
-              <a:t> </a:t>
-            </a:r>
-            <a:r>
-              <a:rPr lang="en-US" err="1">
-                <a:cs typeface="Calibri"/>
-              </a:rPr>
-              <a:t>clé</a:t>
-            </a:r>
-          </a:p>
-          <a:p>
-            <a:endParaRPr lang="en-US">
+              <a:t>Une caméra est reliée à une serrure via une carte électronique (Raspberry ou Arduino)</a:t>
+            </a:r>
+          </a:p>
+          <a:p>
+            <a:endParaRPr lang="fr-FR" dirty="0">
               <a:cs typeface="Calibri"/>
             </a:endParaRPr>
           </a:p>
           <a:p>
             <a:r>
-              <a:rPr lang="en-US">
+              <a:rPr lang="fr-FR" dirty="0">
                 <a:cs typeface="Calibri"/>
               </a:rPr>
-              <a:t>Je </a:t>
-            </a:r>
-            <a:r>
-              <a:rPr lang="en-US" err="1">
-                <a:cs typeface="Calibri"/>
-              </a:rPr>
-              <a:t>veux</a:t>
-            </a:r>
-            <a:r>
-              <a:rPr lang="en-US">
-                <a:cs typeface="Calibri"/>
-              </a:rPr>
-              <a:t> </a:t>
-            </a:r>
-            <a:r>
-              <a:rPr lang="en-US" err="1">
-                <a:cs typeface="Calibri"/>
-              </a:rPr>
-              <a:t>laisser</a:t>
-            </a:r>
-            <a:r>
-              <a:rPr lang="en-US">
-                <a:cs typeface="Calibri"/>
-              </a:rPr>
-              <a:t> </a:t>
-            </a:r>
-            <a:r>
-              <a:rPr lang="en-US" err="1">
-                <a:cs typeface="Calibri"/>
-              </a:rPr>
-              <a:t>quelqu'un</a:t>
-            </a:r>
-            <a:r>
-              <a:rPr lang="en-US">
-                <a:cs typeface="Calibri"/>
-              </a:rPr>
-              <a:t> </a:t>
-            </a:r>
-            <a:r>
-              <a:rPr lang="en-US" err="1">
-                <a:cs typeface="Calibri"/>
-              </a:rPr>
-              <a:t>entrer</a:t>
-            </a:r>
-            <a:r>
-              <a:rPr lang="en-US">
-                <a:cs typeface="Calibri"/>
-              </a:rPr>
-              <a:t> dans mon </a:t>
-            </a:r>
-            <a:r>
-              <a:rPr lang="en-US" err="1">
-                <a:cs typeface="Calibri"/>
-              </a:rPr>
-              <a:t>appartement</a:t>
-            </a:r>
-            <a:r>
-              <a:rPr lang="en-US">
-                <a:cs typeface="Calibri"/>
-              </a:rPr>
-              <a:t> </a:t>
-            </a:r>
-            <a:r>
-              <a:rPr lang="en-US" err="1">
-                <a:cs typeface="Calibri"/>
-              </a:rPr>
-              <a:t>quand</a:t>
-            </a:r>
-            <a:r>
-              <a:rPr lang="en-US">
-                <a:cs typeface="Calibri"/>
-              </a:rPr>
-              <a:t> je </a:t>
-            </a:r>
-            <a:r>
-              <a:rPr lang="en-US" err="1">
-                <a:cs typeface="Calibri"/>
-              </a:rPr>
-              <a:t>suis</a:t>
-            </a:r>
-            <a:r>
-              <a:rPr lang="en-US">
-                <a:cs typeface="Calibri"/>
-              </a:rPr>
-              <a:t> </a:t>
-            </a:r>
-            <a:r>
-              <a:rPr lang="en-US" err="1">
-                <a:cs typeface="Calibri"/>
-              </a:rPr>
-              <a:t>ailleurs</a:t>
-            </a:r>
+              <a:t>La carte électronique est reliée à internet et peut donc requêter une API</a:t>
+            </a:r>
+          </a:p>
+          <a:p>
+            <a:pPr marL="0" indent="0">
+              <a:buNone/>
+            </a:pPr>
+            <a:endParaRPr lang="fr-FR">
+              <a:cs typeface="Calibri"/>
+            </a:endParaRPr>
           </a:p>
         </p:txBody>
       </p:sp>
       <p:pic>
         <p:nvPicPr>
-          <p:cNvPr id="7" name="Picture 7">
+          <p:cNvPr id="11" name="Image 11">
             <a:extLst>
               <a:ext uri="{FF2B5EF4-FFF2-40B4-BE49-F238E27FC236}">
-                <a16:creationId xmlns:a16="http://schemas.microsoft.com/office/drawing/2014/main" id="{A51F28FB-FA46-44AF-A5C0-21371B78CAB5}"/>
+                <a16:creationId xmlns:a16="http://schemas.microsoft.com/office/drawing/2014/main" id="{DD6929F0-D597-4731-BF67-037B797F57BD}"/>
               </a:ext>
             </a:extLst>
           </p:cNvPr>
@@ -4571,18 +5322,237 @@
         </p:blipFill>
         <p:spPr>
           <a:xfrm>
-            <a:off x="5920921" y="559933"/>
-            <a:ext cx="5829300" cy="5248275"/>
+            <a:off x="10071435" y="3334242"/>
+            <a:ext cx="1020105" cy="1020105"/>
           </a:xfrm>
           <a:prstGeom prst="rect">
             <a:avLst/>
           </a:prstGeom>
         </p:spPr>
       </p:pic>
+      <p:pic>
+        <p:nvPicPr>
+          <p:cNvPr id="13" name="Image 13" descr="Une image contenant objet&#10;&#10;Description générée avec un niveau de confiance élevé">
+            <a:extLst>
+              <a:ext uri="{FF2B5EF4-FFF2-40B4-BE49-F238E27FC236}">
+                <a16:creationId xmlns:a16="http://schemas.microsoft.com/office/drawing/2014/main" id="{6B68224C-B8C2-481B-BAD2-1FC4EB1BFEAC}"/>
+              </a:ext>
+            </a:extLst>
+          </p:cNvPr>
+          <p:cNvPicPr>
+            <a:picLocks noChangeAspect="1"/>
+          </p:cNvPicPr>
+          <p:nvPr/>
+        </p:nvPicPr>
+        <p:blipFill>
+          <a:blip r:embed="rId3"/>
+          <a:stretch>
+            <a:fillRect/>
+          </a:stretch>
+        </p:blipFill>
+        <p:spPr>
+          <a:xfrm>
+            <a:off x="8878896" y="4881441"/>
+            <a:ext cx="957036" cy="720272"/>
+          </a:xfrm>
+          <a:prstGeom prst="rect">
+            <a:avLst/>
+          </a:prstGeom>
+        </p:spPr>
+      </p:pic>
+      <p:pic>
+        <p:nvPicPr>
+          <p:cNvPr id="7" name="Image 7">
+            <a:extLst>
+              <a:ext uri="{FF2B5EF4-FFF2-40B4-BE49-F238E27FC236}">
+                <a16:creationId xmlns:a16="http://schemas.microsoft.com/office/drawing/2014/main" id="{BB04647E-62C0-414D-B484-515368C35947}"/>
+              </a:ext>
+            </a:extLst>
+          </p:cNvPr>
+          <p:cNvPicPr>
+            <a:picLocks noChangeAspect="1"/>
+          </p:cNvPicPr>
+          <p:nvPr/>
+        </p:nvPicPr>
+        <p:blipFill>
+          <a:blip r:embed="rId4"/>
+          <a:stretch>
+            <a:fillRect/>
+          </a:stretch>
+        </p:blipFill>
+        <p:spPr>
+          <a:xfrm>
+            <a:off x="7446447" y="3447719"/>
+            <a:ext cx="896258" cy="896258"/>
+          </a:xfrm>
+          <a:prstGeom prst="rect">
+            <a:avLst/>
+          </a:prstGeom>
+        </p:spPr>
+      </p:pic>
+      <p:cxnSp>
+        <p:nvCxnSpPr>
+          <p:cNvPr id="16" name="Connecteur droit avec flèche 15">
+            <a:extLst>
+              <a:ext uri="{FF2B5EF4-FFF2-40B4-BE49-F238E27FC236}">
+                <a16:creationId xmlns:a16="http://schemas.microsoft.com/office/drawing/2014/main" id="{63C173F5-64BC-4538-B50A-53871D342FC9}"/>
+              </a:ext>
+            </a:extLst>
+          </p:cNvPr>
+          <p:cNvCxnSpPr/>
+          <p:nvPr/>
+        </p:nvCxnSpPr>
+        <p:spPr>
+          <a:xfrm>
+            <a:off x="8215085" y="4042228"/>
+            <a:ext cx="914400" cy="914400"/>
+          </a:xfrm>
+          <a:prstGeom prst="straightConnector1">
+            <a:avLst/>
+          </a:prstGeom>
+          <a:ln w="57150">
+            <a:solidFill>
+              <a:srgbClr val="FF0000"/>
+            </a:solidFill>
+          </a:ln>
+        </p:spPr>
+        <p:style>
+          <a:lnRef idx="3">
+            <a:schemeClr val="accent2"/>
+          </a:lnRef>
+          <a:fillRef idx="0">
+            <a:schemeClr val="accent2"/>
+          </a:fillRef>
+          <a:effectRef idx="2">
+            <a:schemeClr val="accent2"/>
+          </a:effectRef>
+          <a:fontRef idx="minor">
+            <a:schemeClr val="tx1"/>
+          </a:fontRef>
+        </p:style>
+      </p:cxnSp>
+      <p:cxnSp>
+        <p:nvCxnSpPr>
+          <p:cNvPr id="17" name="Connecteur droit avec flèche 16">
+            <a:extLst>
+              <a:ext uri="{FF2B5EF4-FFF2-40B4-BE49-F238E27FC236}">
+                <a16:creationId xmlns:a16="http://schemas.microsoft.com/office/drawing/2014/main" id="{77CBF165-3D40-428B-842A-1EF9EA8ED457}"/>
+              </a:ext>
+            </a:extLst>
+          </p:cNvPr>
+          <p:cNvCxnSpPr>
+            <a:cxnSpLocks/>
+          </p:cNvCxnSpPr>
+          <p:nvPr/>
+        </p:nvCxnSpPr>
+        <p:spPr>
+          <a:xfrm flipV="1">
+            <a:off x="9457870" y="3922485"/>
+            <a:ext cx="633186" cy="1026885"/>
+          </a:xfrm>
+          <a:prstGeom prst="straightConnector1">
+            <a:avLst/>
+          </a:prstGeom>
+          <a:ln w="57150">
+            <a:solidFill>
+              <a:srgbClr val="FF0000"/>
+            </a:solidFill>
+          </a:ln>
+        </p:spPr>
+        <p:style>
+          <a:lnRef idx="3">
+            <a:schemeClr val="accent2"/>
+          </a:lnRef>
+          <a:fillRef idx="0">
+            <a:schemeClr val="accent2"/>
+          </a:fillRef>
+          <a:effectRef idx="2">
+            <a:schemeClr val="accent2"/>
+          </a:effectRef>
+          <a:fontRef idx="minor">
+            <a:schemeClr val="tx1"/>
+          </a:fontRef>
+        </p:style>
+      </p:cxnSp>
+      <p:pic>
+        <p:nvPicPr>
+          <p:cNvPr id="18" name="Image 18">
+            <a:extLst>
+              <a:ext uri="{FF2B5EF4-FFF2-40B4-BE49-F238E27FC236}">
+                <a16:creationId xmlns:a16="http://schemas.microsoft.com/office/drawing/2014/main" id="{9D77B05F-95DA-49DE-84DA-7D1758DBE4B3}"/>
+              </a:ext>
+            </a:extLst>
+          </p:cNvPr>
+          <p:cNvPicPr>
+            <a:picLocks noChangeAspect="1"/>
+          </p:cNvPicPr>
+          <p:nvPr/>
+        </p:nvPicPr>
+        <p:blipFill>
+          <a:blip r:embed="rId5"/>
+          <a:stretch>
+            <a:fillRect/>
+          </a:stretch>
+        </p:blipFill>
+        <p:spPr>
+          <a:xfrm rot="7320000">
+            <a:off x="10070872" y="5431290"/>
+            <a:ext cx="1221468" cy="812347"/>
+          </a:xfrm>
+          <a:prstGeom prst="rect">
+            <a:avLst/>
+          </a:prstGeom>
+        </p:spPr>
+      </p:pic>
+      <p:sp>
+        <p:nvSpPr>
+          <p:cNvPr id="20" name="ZoneTexte 19">
+            <a:extLst>
+              <a:ext uri="{FF2B5EF4-FFF2-40B4-BE49-F238E27FC236}">
+                <a16:creationId xmlns:a16="http://schemas.microsoft.com/office/drawing/2014/main" id="{3AD7D26B-457A-477F-AEF6-E21E69D4224A}"/>
+              </a:ext>
+            </a:extLst>
+          </p:cNvPr>
+          <p:cNvSpPr txBox="1"/>
+          <p:nvPr/>
+        </p:nvSpPr>
+        <p:spPr>
+          <a:xfrm>
+            <a:off x="6529614" y="2774042"/>
+            <a:ext cx="2743200" cy="369332"/>
+          </a:xfrm>
+          <a:prstGeom prst="rect">
+            <a:avLst/>
+          </a:prstGeom>
+        </p:spPr>
+        <p:txBody>
+          <a:bodyPr rot="0" spcFirstLastPara="0" vertOverflow="overflow" horzOverflow="overflow" vert="horz" wrap="square" lIns="91440" tIns="45720" rIns="91440" bIns="45720" numCol="1" spcCol="0" rtlCol="0" fromWordArt="0" anchor="t" anchorCtr="0" forceAA="0" compatLnSpc="1">
+            <a:prstTxWarp prst="textNoShape">
+              <a:avLst/>
+            </a:prstTxWarp>
+            <a:spAutoFit/>
+          </a:bodyPr>
+          <a:lstStyle/>
+          <a:p>
+            <a:pPr algn="ctr"/>
+            <a:r>
+              <a:rPr lang="fr-FR"/>
+              <a:t>Serrure </a:t>
+            </a:r>
+            <a:r>
+              <a:rPr lang="fr-FR">
+                <a:cs typeface="Calibri"/>
+              </a:rPr>
+              <a:t>n°1234</a:t>
+            </a:r>
+            <a:endParaRPr lang="fr-FR"/>
+          </a:p>
+        </p:txBody>
+      </p:sp>
     </p:spTree>
     <p:extLst>
       <p:ext uri="{BB962C8B-B14F-4D97-AF65-F5344CB8AC3E}">
-        <p14:creationId xmlns:p14="http://schemas.microsoft.com/office/powerpoint/2010/main" val="650318688"/>
+        <p14:creationId xmlns:p14="http://schemas.microsoft.com/office/powerpoint/2010/main" val="771985797"/>
       </p:ext>
     </p:extLst>
   </p:cSld>
@@ -4611,10 +5581,10 @@
       </p:grpSpPr>
       <p:sp>
         <p:nvSpPr>
-          <p:cNvPr id="2" name="Titre 1">
+          <p:cNvPr id="4" name="Espace réservé du contenu 3">
             <a:extLst>
               <a:ext uri="{FF2B5EF4-FFF2-40B4-BE49-F238E27FC236}">
-                <a16:creationId xmlns:a16="http://schemas.microsoft.com/office/drawing/2014/main" id="{5D471AD0-092C-48F8-A876-F4DFF47A692F}"/>
+                <a16:creationId xmlns:a16="http://schemas.microsoft.com/office/drawing/2014/main" id="{035F60B4-BC9B-49FB-8503-0D281BB8225F}"/>
               </a:ext>
             </a:extLst>
           </p:cNvPr>
@@ -4622,135 +5592,216 @@
             <a:spLocks noGrp="1"/>
           </p:cNvSpPr>
           <p:nvPr>
-            <p:ph type="title"/>
-          </p:nvPr>
-        </p:nvSpPr>
-        <p:spPr/>
-        <p:txBody>
-          <a:bodyPr/>
-          <a:lstStyle/>
-          <a:p>
-            <a:r>
-              <a:rPr lang="fr-FR">
-                <a:cs typeface="Calibri Light"/>
-              </a:rPr>
-              <a:t>POC</a:t>
-            </a:r>
-            <a:endParaRPr lang="fr-FR"/>
-          </a:p>
-        </p:txBody>
-      </p:sp>
-      <p:sp>
-        <p:nvSpPr>
-          <p:cNvPr id="4" name="Espace réservé du contenu 3">
+            <p:ph sz="half" idx="2"/>
+          </p:nvPr>
+        </p:nvSpPr>
+        <p:spPr>
+          <a:xfrm>
+            <a:off x="839788" y="2904218"/>
+            <a:ext cx="5157787" cy="3684588"/>
+          </a:xfrm>
+        </p:spPr>
+        <p:txBody>
+          <a:bodyPr vert="horz" lIns="91440" tIns="45720" rIns="91440" bIns="45720" rtlCol="0" anchor="t">
+            <a:normAutofit/>
+          </a:bodyPr>
+          <a:lstStyle/>
+          <a:p>
+            <a:r>
+              <a:rPr lang="fr-FR" dirty="0">
+                <a:cs typeface="Calibri"/>
+              </a:rPr>
+              <a:t>Via une plateforme en ligne je peux voir ma serrure</a:t>
+            </a:r>
+            <a:endParaRPr lang="fr-FR" dirty="0"/>
+          </a:p>
+          <a:p>
+            <a:endParaRPr lang="fr-FR">
+              <a:cs typeface="Calibri"/>
+            </a:endParaRPr>
+          </a:p>
+          <a:p>
+            <a:r>
+              <a:rPr lang="fr-FR" dirty="0">
+                <a:cs typeface="Calibri"/>
+              </a:rPr>
+              <a:t>Je désigne qui a le droit d'ouvrir ma porte</a:t>
+            </a:r>
+          </a:p>
+          <a:p>
+            <a:pPr marL="0" indent="0">
+              <a:buNone/>
+            </a:pPr>
+            <a:endParaRPr lang="fr-FR">
+              <a:cs typeface="Calibri"/>
+            </a:endParaRPr>
+          </a:p>
+        </p:txBody>
+      </p:sp>
+      <p:pic>
+        <p:nvPicPr>
+          <p:cNvPr id="3" name="Image 4">
             <a:extLst>
               <a:ext uri="{FF2B5EF4-FFF2-40B4-BE49-F238E27FC236}">
-                <a16:creationId xmlns:a16="http://schemas.microsoft.com/office/drawing/2014/main" id="{99D376F0-68CB-444A-95DC-0889CA06E645}"/>
+                <a16:creationId xmlns:a16="http://schemas.microsoft.com/office/drawing/2014/main" id="{18F64276-B5AB-4956-9D5E-247CF6F03F3E}"/>
               </a:ext>
             </a:extLst>
           </p:cNvPr>
-          <p:cNvSpPr>
-            <a:spLocks noGrp="1"/>
-          </p:cNvSpPr>
-          <p:nvPr>
-            <p:ph sz="half" idx="2"/>
-          </p:nvPr>
-        </p:nvSpPr>
+          <p:cNvPicPr>
+            <a:picLocks noChangeAspect="1"/>
+          </p:cNvPicPr>
+          <p:nvPr/>
+        </p:nvPicPr>
+        <p:blipFill>
+          <a:blip r:embed="rId2"/>
+          <a:stretch>
+            <a:fillRect/>
+          </a:stretch>
+        </p:blipFill>
         <p:spPr>
           <a:xfrm>
-            <a:off x="839788" y="1798832"/>
-            <a:ext cx="7350860" cy="4632441"/>
+            <a:off x="5818957" y="2600122"/>
+            <a:ext cx="6441223" cy="3380445"/>
           </a:xfrm>
+          <a:prstGeom prst="rect">
+            <a:avLst/>
+          </a:prstGeom>
         </p:spPr>
-        <p:txBody>
-          <a:bodyPr vert="horz" lIns="91440" tIns="45720" rIns="91440" bIns="45720" rtlCol="0" anchor="t">
-            <a:normAutofit/>
+      </p:pic>
+      <p:sp>
+        <p:nvSpPr>
+          <p:cNvPr id="6" name="ZoneTexte 5">
+            <a:extLst>
+              <a:ext uri="{FF2B5EF4-FFF2-40B4-BE49-F238E27FC236}">
+                <a16:creationId xmlns:a16="http://schemas.microsoft.com/office/drawing/2014/main" id="{5D7D52C4-0CF8-4665-BDF0-CA8756F6BB1A}"/>
+              </a:ext>
+            </a:extLst>
+          </p:cNvPr>
+          <p:cNvSpPr txBox="1"/>
+          <p:nvPr/>
+        </p:nvSpPr>
+        <p:spPr>
+          <a:xfrm>
+            <a:off x="7600041" y="3590471"/>
+            <a:ext cx="2743200" cy="369332"/>
+          </a:xfrm>
+          <a:prstGeom prst="rect">
+            <a:avLst/>
+          </a:prstGeom>
+        </p:spPr>
+        <p:txBody>
+          <a:bodyPr rot="0" spcFirstLastPara="0" vertOverflow="overflow" horzOverflow="overflow" vert="horz" wrap="square" lIns="91440" tIns="45720" rIns="91440" bIns="45720" numCol="1" spcCol="0" rtlCol="0" fromWordArt="0" anchor="t" anchorCtr="0" forceAA="0" compatLnSpc="1">
+            <a:prstTxWarp prst="textNoShape">
+              <a:avLst/>
+            </a:prstTxWarp>
+            <a:spAutoFit/>
           </a:bodyPr>
           <a:lstStyle/>
           <a:p>
+            <a:pPr algn="ctr"/>
+            <a:r>
+              <a:rPr lang="fr-FR"/>
+              <a:t>Serrure </a:t>
+            </a:r>
             <a:r>
               <a:rPr lang="fr-FR">
                 <a:cs typeface="Calibri"/>
               </a:rPr>
-              <a:t>Côté serveur / API</a:t>
-            </a:r>
-          </a:p>
-          <a:p>
-            <a:pPr lvl="1"/>
-            <a:r>
-              <a:rPr lang="fr-FR">
-                <a:cs typeface="Calibri"/>
-              </a:rPr>
-              <a:t>Pouvoir créer un compte</a:t>
-            </a:r>
-          </a:p>
-          <a:p>
-            <a:pPr lvl="1"/>
-            <a:r>
-              <a:rPr lang="fr-FR">
-                <a:cs typeface="Calibri"/>
-              </a:rPr>
-              <a:t>Pouvoir ajouter des photos à son compte</a:t>
-            </a:r>
-          </a:p>
-          <a:p>
-            <a:pPr lvl="1"/>
-            <a:r>
-              <a:rPr lang="fr-FR">
-                <a:cs typeface="Calibri"/>
-              </a:rPr>
-              <a:t>Pouvoir créer une clé virtuelle</a:t>
-            </a:r>
-          </a:p>
-          <a:p>
-            <a:pPr lvl="1"/>
-            <a:r>
-              <a:rPr lang="fr-FR">
-                <a:cs typeface="Calibri"/>
-              </a:rPr>
-              <a:t>Pouvoir autoriser des personnes à utiliser la clé</a:t>
-            </a:r>
-          </a:p>
-          <a:p>
-            <a:r>
-              <a:rPr lang="fr-FR">
-                <a:cs typeface="Calibri"/>
-              </a:rPr>
-              <a:t>Côté client</a:t>
-            </a:r>
-          </a:p>
-          <a:p>
-            <a:pPr lvl="1"/>
-            <a:r>
-              <a:rPr lang="fr-FR">
-                <a:cs typeface="Calibri"/>
-              </a:rPr>
-              <a:t>Une interface simple qui permet de gérer ses clés</a:t>
-            </a:r>
-          </a:p>
-          <a:p>
-            <a:r>
-              <a:rPr lang="fr-FR">
-                <a:cs typeface="Calibri"/>
-              </a:rPr>
-              <a:t>Côté intelligence artificielle</a:t>
-            </a:r>
-          </a:p>
-          <a:p>
-            <a:pPr lvl="1"/>
-            <a:r>
-              <a:rPr lang="fr-FR">
-                <a:cs typeface="Calibri"/>
-              </a:rPr>
-              <a:t>Une IA qui distingue les visages</a:t>
-            </a:r>
+              <a:t>n°1234</a:t>
+            </a:r>
+            <a:endParaRPr lang="fr-FR"/>
+          </a:p>
+        </p:txBody>
+      </p:sp>
+      <p:pic>
+        <p:nvPicPr>
+          <p:cNvPr id="8" name="Image 8">
+            <a:extLst>
+              <a:ext uri="{FF2B5EF4-FFF2-40B4-BE49-F238E27FC236}">
+                <a16:creationId xmlns:a16="http://schemas.microsoft.com/office/drawing/2014/main" id="{BA1E7450-92A4-4D85-B320-49EE386011D7}"/>
+              </a:ext>
+            </a:extLst>
+          </p:cNvPr>
+          <p:cNvPicPr>
+            <a:picLocks noChangeAspect="1"/>
+          </p:cNvPicPr>
+          <p:nvPr/>
+        </p:nvPicPr>
+        <p:blipFill>
+          <a:blip r:embed="rId3"/>
+          <a:stretch>
+            <a:fillRect/>
+          </a:stretch>
+        </p:blipFill>
+        <p:spPr>
+          <a:xfrm>
+            <a:off x="8211457" y="4038600"/>
+            <a:ext cx="431802" cy="431802"/>
+          </a:xfrm>
+          <a:prstGeom prst="rect">
+            <a:avLst/>
+          </a:prstGeom>
+        </p:spPr>
+      </p:pic>
+      <p:pic>
+        <p:nvPicPr>
+          <p:cNvPr id="10" name="Image 13" descr="Une image contenant graphiques vectoriels&#10;&#10;Description générée avec un niveau de confiance très élevé">
+            <a:extLst>
+              <a:ext uri="{FF2B5EF4-FFF2-40B4-BE49-F238E27FC236}">
+                <a16:creationId xmlns:a16="http://schemas.microsoft.com/office/drawing/2014/main" id="{2D6F1F43-2B0F-4445-A43C-255002CC8F7B}"/>
+              </a:ext>
+            </a:extLst>
+          </p:cNvPr>
+          <p:cNvPicPr>
+            <a:picLocks noChangeAspect="1"/>
+          </p:cNvPicPr>
+          <p:nvPr/>
+        </p:nvPicPr>
+        <p:blipFill>
+          <a:blip r:embed="rId4"/>
+          <a:stretch>
+            <a:fillRect/>
+          </a:stretch>
+        </p:blipFill>
+        <p:spPr>
+          <a:xfrm>
+            <a:off x="8810171" y="4038602"/>
+            <a:ext cx="404587" cy="395516"/>
+          </a:xfrm>
+          <a:prstGeom prst="rect">
+            <a:avLst/>
+          </a:prstGeom>
+        </p:spPr>
+      </p:pic>
+      <p:sp>
+        <p:nvSpPr>
+          <p:cNvPr id="19" name="Titre 18">
+            <a:extLst>
+              <a:ext uri="{FF2B5EF4-FFF2-40B4-BE49-F238E27FC236}">
+                <a16:creationId xmlns:a16="http://schemas.microsoft.com/office/drawing/2014/main" id="{088168B0-9DBE-4225-B78D-C3D97E43518E}"/>
+              </a:ext>
+            </a:extLst>
+          </p:cNvPr>
+          <p:cNvSpPr>
+            <a:spLocks noGrp="1"/>
+          </p:cNvSpPr>
+          <p:nvPr>
+            <p:ph type="title"/>
+          </p:nvPr>
+        </p:nvSpPr>
+        <p:spPr/>
+        <p:txBody>
+          <a:bodyPr/>
+          <a:lstStyle/>
+          <a:p>
+            <a:endParaRPr lang="fr-FR"/>
           </a:p>
         </p:txBody>
       </p:sp>
     </p:spTree>
     <p:extLst>
       <p:ext uri="{BB962C8B-B14F-4D97-AF65-F5344CB8AC3E}">
-        <p14:creationId xmlns:p14="http://schemas.microsoft.com/office/powerpoint/2010/main" val="1174928216"/>
+        <p14:creationId xmlns:p14="http://schemas.microsoft.com/office/powerpoint/2010/main" val="2459232083"/>
       </p:ext>
     </p:extLst>
   </p:cSld>
@@ -4782,7 +5833,7 @@
           <p:cNvPr id="2" name="Titre 1">
             <a:extLst>
               <a:ext uri="{FF2B5EF4-FFF2-40B4-BE49-F238E27FC236}">
-                <a16:creationId xmlns:a16="http://schemas.microsoft.com/office/drawing/2014/main" id="{39CB05C1-791D-46C4-931A-6545A1B8DBB5}"/>
+                <a16:creationId xmlns:a16="http://schemas.microsoft.com/office/drawing/2014/main" id="{2A2F1618-C26E-4A72-8DDF-E2C6CA73CC98}"/>
               </a:ext>
             </a:extLst>
           </p:cNvPr>
@@ -4798,22 +5849,16 @@
           <a:bodyPr/>
           <a:lstStyle/>
           <a:p>
-            <a:r>
-              <a:rPr lang="fr-FR">
-                <a:cs typeface="Calibri Light"/>
-              </a:rPr>
-              <a:t>Technologies</a:t>
-            </a:r>
             <a:endParaRPr lang="fr-FR"/>
           </a:p>
         </p:txBody>
       </p:sp>
       <p:sp>
         <p:nvSpPr>
-          <p:cNvPr id="8" name="Text Placeholder 4">
+          <p:cNvPr id="4" name="Espace réservé du contenu 3">
             <a:extLst>
               <a:ext uri="{FF2B5EF4-FFF2-40B4-BE49-F238E27FC236}">
-                <a16:creationId xmlns:a16="http://schemas.microsoft.com/office/drawing/2014/main" id="{E142076A-D80B-4913-BCF7-D53488E6982E}"/>
+                <a16:creationId xmlns:a16="http://schemas.microsoft.com/office/drawing/2014/main" id="{A3374A4A-3FEF-4ACC-A836-B0A4C14939B6}"/>
               </a:ext>
             </a:extLst>
           </p:cNvPr>
@@ -4824,12 +5869,7 @@
             <p:ph sz="half" idx="2"/>
           </p:nvPr>
         </p:nvSpPr>
-        <p:spPr>
-          <a:xfrm>
-            <a:off x="841297" y="2979909"/>
-            <a:ext cx="5181600" cy="4351338"/>
-          </a:xfrm>
-        </p:spPr>
+        <p:spPr/>
         <p:txBody>
           <a:bodyPr vert="horz" lIns="91440" tIns="45720" rIns="91440" bIns="45720" rtlCol="0" anchor="t">
             <a:normAutofit/>
@@ -4837,42 +5877,298 @@
           <a:lstStyle/>
           <a:p>
             <a:r>
-              <a:rPr lang="en-US" dirty="0">
+              <a:rPr lang="fr-FR" dirty="0">
                 <a:cs typeface="Calibri"/>
               </a:rPr>
-              <a:t>Docker</a:t>
-            </a:r>
-          </a:p>
-          <a:p>
-            <a:r>
-              <a:rPr lang="en-US" dirty="0" err="1">
+              <a:t>Quand quelqu'un est devant la caméra, on envoie une requête à notre API</a:t>
+            </a:r>
+          </a:p>
+          <a:p>
+            <a:r>
+              <a:rPr lang="fr-FR" dirty="0">
                 <a:cs typeface="Calibri"/>
               </a:rPr>
-              <a:t>Tensorflow</a:t>
-            </a:r>
-          </a:p>
-          <a:p>
-            <a:r>
-              <a:rPr lang="en-US" dirty="0">
+              <a:t>Une IA reconnait la personne et regarde si elle peut entrer ou non</a:t>
+            </a:r>
+          </a:p>
+          <a:p>
+            <a:r>
+              <a:rPr lang="fr-FR" dirty="0">
                 <a:cs typeface="Calibri"/>
               </a:rPr>
-              <a:t>Django</a:t>
-            </a:r>
-          </a:p>
-          <a:p>
-            <a:r>
-              <a:rPr lang="en-US" dirty="0">
-                <a:cs typeface="Calibri"/>
-              </a:rPr>
-              <a:t>React JS</a:t>
-            </a:r>
-          </a:p>
-        </p:txBody>
-      </p:sp>
+              <a:t>On ouvre le cadenas suivant la réponse de l'API</a:t>
+            </a:r>
+          </a:p>
+        </p:txBody>
+      </p:sp>
+      <p:pic>
+        <p:nvPicPr>
+          <p:cNvPr id="7" name="Image 7">
+            <a:extLst>
+              <a:ext uri="{FF2B5EF4-FFF2-40B4-BE49-F238E27FC236}">
+                <a16:creationId xmlns:a16="http://schemas.microsoft.com/office/drawing/2014/main" id="{A8C38B0A-2AF8-4821-8C73-32DE9FF8FAE0}"/>
+              </a:ext>
+            </a:extLst>
+          </p:cNvPr>
+          <p:cNvPicPr>
+            <a:picLocks noChangeAspect="1"/>
+          </p:cNvPicPr>
+          <p:nvPr/>
+        </p:nvPicPr>
+        <p:blipFill>
+          <a:blip r:embed="rId2"/>
+          <a:stretch>
+            <a:fillRect/>
+          </a:stretch>
+        </p:blipFill>
+        <p:spPr>
+          <a:xfrm>
+            <a:off x="10432186" y="5034643"/>
+            <a:ext cx="1533293" cy="1533293"/>
+          </a:xfrm>
+          <a:prstGeom prst="rect">
+            <a:avLst/>
+          </a:prstGeom>
+        </p:spPr>
+      </p:pic>
+      <p:pic>
+        <p:nvPicPr>
+          <p:cNvPr id="10" name="Image 11">
+            <a:extLst>
+              <a:ext uri="{FF2B5EF4-FFF2-40B4-BE49-F238E27FC236}">
+                <a16:creationId xmlns:a16="http://schemas.microsoft.com/office/drawing/2014/main" id="{6A79AD86-C7B9-4415-853E-F85CD7DC9D78}"/>
+              </a:ext>
+            </a:extLst>
+          </p:cNvPr>
+          <p:cNvPicPr>
+            <a:picLocks noChangeAspect="1"/>
+          </p:cNvPicPr>
+          <p:nvPr/>
+        </p:nvPicPr>
+        <p:blipFill>
+          <a:blip r:embed="rId3"/>
+          <a:stretch>
+            <a:fillRect/>
+          </a:stretch>
+        </p:blipFill>
+        <p:spPr>
+          <a:xfrm>
+            <a:off x="9309435" y="2005387"/>
+            <a:ext cx="1020105" cy="1020105"/>
+          </a:xfrm>
+          <a:prstGeom prst="rect">
+            <a:avLst/>
+          </a:prstGeom>
+        </p:spPr>
+      </p:pic>
+      <p:pic>
+        <p:nvPicPr>
+          <p:cNvPr id="12" name="Image 13" descr="Une image contenant objet&#10;&#10;Description générée avec un niveau de confiance élevé">
+            <a:extLst>
+              <a:ext uri="{FF2B5EF4-FFF2-40B4-BE49-F238E27FC236}">
+                <a16:creationId xmlns:a16="http://schemas.microsoft.com/office/drawing/2014/main" id="{5FBF5C21-1533-4918-9A29-152100032110}"/>
+              </a:ext>
+            </a:extLst>
+          </p:cNvPr>
+          <p:cNvPicPr>
+            <a:picLocks noChangeAspect="1"/>
+          </p:cNvPicPr>
+          <p:nvPr/>
+        </p:nvPicPr>
+        <p:blipFill>
+          <a:blip r:embed="rId4"/>
+          <a:stretch>
+            <a:fillRect/>
+          </a:stretch>
+        </p:blipFill>
+        <p:spPr>
+          <a:xfrm>
+            <a:off x="8116896" y="3552587"/>
+            <a:ext cx="957036" cy="720272"/>
+          </a:xfrm>
+          <a:prstGeom prst="rect">
+            <a:avLst/>
+          </a:prstGeom>
+        </p:spPr>
+      </p:pic>
+      <p:pic>
+        <p:nvPicPr>
+          <p:cNvPr id="14" name="Image 7">
+            <a:extLst>
+              <a:ext uri="{FF2B5EF4-FFF2-40B4-BE49-F238E27FC236}">
+                <a16:creationId xmlns:a16="http://schemas.microsoft.com/office/drawing/2014/main" id="{1ED13845-319B-49A0-9AA2-8483D185CECD}"/>
+              </a:ext>
+            </a:extLst>
+          </p:cNvPr>
+          <p:cNvPicPr>
+            <a:picLocks noChangeAspect="1"/>
+          </p:cNvPicPr>
+          <p:nvPr/>
+        </p:nvPicPr>
+        <p:blipFill>
+          <a:blip r:embed="rId5"/>
+          <a:stretch>
+            <a:fillRect/>
+          </a:stretch>
+        </p:blipFill>
+        <p:spPr>
+          <a:xfrm>
+            <a:off x="6684446" y="2118864"/>
+            <a:ext cx="896258" cy="896258"/>
+          </a:xfrm>
+          <a:prstGeom prst="rect">
+            <a:avLst/>
+          </a:prstGeom>
+        </p:spPr>
+      </p:pic>
+      <p:cxnSp>
+        <p:nvCxnSpPr>
+          <p:cNvPr id="16" name="Connecteur droit avec flèche 15">
+            <a:extLst>
+              <a:ext uri="{FF2B5EF4-FFF2-40B4-BE49-F238E27FC236}">
+                <a16:creationId xmlns:a16="http://schemas.microsoft.com/office/drawing/2014/main" id="{6416DA25-425F-45CC-A09E-3129FD7758E7}"/>
+              </a:ext>
+            </a:extLst>
+          </p:cNvPr>
+          <p:cNvCxnSpPr/>
+          <p:nvPr/>
+        </p:nvCxnSpPr>
+        <p:spPr>
+          <a:xfrm>
+            <a:off x="7453085" y="2713373"/>
+            <a:ext cx="914400" cy="914400"/>
+          </a:xfrm>
+          <a:prstGeom prst="straightConnector1">
+            <a:avLst/>
+          </a:prstGeom>
+          <a:ln w="57150">
+            <a:solidFill>
+              <a:srgbClr val="FF0000"/>
+            </a:solidFill>
+          </a:ln>
+        </p:spPr>
+        <p:style>
+          <a:lnRef idx="3">
+            <a:schemeClr val="accent2"/>
+          </a:lnRef>
+          <a:fillRef idx="0">
+            <a:schemeClr val="accent2"/>
+          </a:fillRef>
+          <a:effectRef idx="2">
+            <a:schemeClr val="accent2"/>
+          </a:effectRef>
+          <a:fontRef idx="minor">
+            <a:schemeClr val="tx1"/>
+          </a:fontRef>
+        </p:style>
+      </p:cxnSp>
+      <p:cxnSp>
+        <p:nvCxnSpPr>
+          <p:cNvPr id="18" name="Connecteur droit avec flèche 17">
+            <a:extLst>
+              <a:ext uri="{FF2B5EF4-FFF2-40B4-BE49-F238E27FC236}">
+                <a16:creationId xmlns:a16="http://schemas.microsoft.com/office/drawing/2014/main" id="{E2EAA4C7-C9A7-4819-A686-7FFDF7E3DF95}"/>
+              </a:ext>
+            </a:extLst>
+          </p:cNvPr>
+          <p:cNvCxnSpPr>
+            <a:cxnSpLocks/>
+          </p:cNvCxnSpPr>
+          <p:nvPr/>
+        </p:nvCxnSpPr>
+        <p:spPr>
+          <a:xfrm flipV="1">
+            <a:off x="8695870" y="2593631"/>
+            <a:ext cx="633186" cy="1026885"/>
+          </a:xfrm>
+          <a:prstGeom prst="straightConnector1">
+            <a:avLst/>
+          </a:prstGeom>
+          <a:ln w="57150">
+            <a:solidFill>
+              <a:srgbClr val="FF0000"/>
+            </a:solidFill>
+          </a:ln>
+        </p:spPr>
+        <p:style>
+          <a:lnRef idx="3">
+            <a:schemeClr val="accent2"/>
+          </a:lnRef>
+          <a:fillRef idx="0">
+            <a:schemeClr val="accent2"/>
+          </a:fillRef>
+          <a:effectRef idx="2">
+            <a:schemeClr val="accent2"/>
+          </a:effectRef>
+          <a:fontRef idx="minor">
+            <a:schemeClr val="tx1"/>
+          </a:fontRef>
+        </p:style>
+      </p:cxnSp>
+      <p:pic>
+        <p:nvPicPr>
+          <p:cNvPr id="20" name="Image 18">
+            <a:extLst>
+              <a:ext uri="{FF2B5EF4-FFF2-40B4-BE49-F238E27FC236}">
+                <a16:creationId xmlns:a16="http://schemas.microsoft.com/office/drawing/2014/main" id="{ECC76B8A-9A1A-4075-B7F7-77312677E3DF}"/>
+              </a:ext>
+            </a:extLst>
+          </p:cNvPr>
+          <p:cNvPicPr>
+            <a:picLocks noChangeAspect="1"/>
+          </p:cNvPicPr>
+          <p:nvPr/>
+        </p:nvPicPr>
+        <p:blipFill>
+          <a:blip r:embed="rId6"/>
+          <a:stretch>
+            <a:fillRect/>
+          </a:stretch>
+        </p:blipFill>
+        <p:spPr>
+          <a:xfrm rot="7320000">
+            <a:off x="9154657" y="4283865"/>
+            <a:ext cx="1221468" cy="812347"/>
+          </a:xfrm>
+          <a:prstGeom prst="rect">
+            <a:avLst/>
+          </a:prstGeom>
+        </p:spPr>
+      </p:pic>
+      <p:pic>
+        <p:nvPicPr>
+          <p:cNvPr id="22" name="Image 8">
+            <a:extLst>
+              <a:ext uri="{FF2B5EF4-FFF2-40B4-BE49-F238E27FC236}">
+                <a16:creationId xmlns:a16="http://schemas.microsoft.com/office/drawing/2014/main" id="{A5F9ADFB-C635-4616-B19B-6BC36C876EFC}"/>
+              </a:ext>
+            </a:extLst>
+          </p:cNvPr>
+          <p:cNvPicPr>
+            <a:picLocks noChangeAspect="1"/>
+          </p:cNvPicPr>
+          <p:nvPr/>
+        </p:nvPicPr>
+        <p:blipFill>
+          <a:blip r:embed="rId7"/>
+          <a:stretch>
+            <a:fillRect/>
+          </a:stretch>
+        </p:blipFill>
+        <p:spPr>
+          <a:xfrm>
+            <a:off x="10715172" y="1915884"/>
+            <a:ext cx="1338945" cy="1311731"/>
+          </a:xfrm>
+          <a:prstGeom prst="rect">
+            <a:avLst/>
+          </a:prstGeom>
+        </p:spPr>
+      </p:pic>
     </p:spTree>
     <p:extLst>
       <p:ext uri="{BB962C8B-B14F-4D97-AF65-F5344CB8AC3E}">
-        <p14:creationId xmlns:p14="http://schemas.microsoft.com/office/powerpoint/2010/main" val="488360729"/>
+        <p14:creationId xmlns:p14="http://schemas.microsoft.com/office/powerpoint/2010/main" val="2660925882"/>
       </p:ext>
     </p:extLst>
   </p:cSld>
@@ -4901,10 +6197,10 @@
       </p:grpSpPr>
       <p:sp>
         <p:nvSpPr>
-          <p:cNvPr id="2" name="Title 1">
+          <p:cNvPr id="2" name="Titre 1">
             <a:extLst>
               <a:ext uri="{FF2B5EF4-FFF2-40B4-BE49-F238E27FC236}">
-                <a16:creationId xmlns:a16="http://schemas.microsoft.com/office/drawing/2014/main" id="{78650531-55E3-49D3-BC7F-99F95EA218A2}"/>
+                <a16:creationId xmlns:a16="http://schemas.microsoft.com/office/drawing/2014/main" id="{5D471AD0-092C-48F8-A876-F4DFF47A692F}"/>
               </a:ext>
             </a:extLst>
           </p:cNvPr>
@@ -4921,51 +6217,96 @@
           <a:lstStyle/>
           <a:p>
             <a:r>
-              <a:rPr lang="en-US">
+              <a:rPr lang="fr-FR">
                 <a:cs typeface="Calibri Light"/>
               </a:rPr>
-              <a:t>Architecture</a:t>
+              <a:t>POC: Côté client</a:t>
             </a:r>
             <a:endParaRPr lang="fr-FR"/>
           </a:p>
         </p:txBody>
       </p:sp>
-      <p:pic>
-        <p:nvPicPr>
-          <p:cNvPr id="5" name="Image 5" descr="Une image contenant texte&#10;&#10;Description générée avec un niveau de confiance élevé">
+      <p:sp>
+        <p:nvSpPr>
+          <p:cNvPr id="4" name="Espace réservé du contenu 3">
             <a:extLst>
               <a:ext uri="{FF2B5EF4-FFF2-40B4-BE49-F238E27FC236}">
-                <a16:creationId xmlns:a16="http://schemas.microsoft.com/office/drawing/2014/main" id="{142B216D-98BC-4F39-897C-56C2BEA5CEA1}"/>
+                <a16:creationId xmlns:a16="http://schemas.microsoft.com/office/drawing/2014/main" id="{99D376F0-68CB-444A-95DC-0889CA06E645}"/>
               </a:ext>
             </a:extLst>
           </p:cNvPr>
-          <p:cNvPicPr>
-            <a:picLocks noGrp="1" noChangeAspect="1"/>
-          </p:cNvPicPr>
+          <p:cNvSpPr>
+            <a:spLocks noGrp="1"/>
+          </p:cNvSpPr>
           <p:nvPr>
             <p:ph sz="half" idx="2"/>
           </p:nvPr>
-        </p:nvPicPr>
-        <p:blipFill>
-          <a:blip r:embed="rId2"/>
-          <a:stretch>
-            <a:fillRect/>
-          </a:stretch>
-        </p:blipFill>
+        </p:nvSpPr>
         <p:spPr>
           <a:xfrm>
-            <a:off x="4184831" y="1324904"/>
-            <a:ext cx="5781040" cy="5413027"/>
+            <a:off x="839788" y="2560832"/>
+            <a:ext cx="8312431" cy="4632441"/>
           </a:xfrm>
-          <a:prstGeom prst="rect">
-            <a:avLst/>
-          </a:prstGeom>
         </p:spPr>
-      </p:pic>
+        <p:txBody>
+          <a:bodyPr vert="horz" lIns="91440" tIns="45720" rIns="91440" bIns="45720" rtlCol="0" anchor="t">
+            <a:normAutofit/>
+          </a:bodyPr>
+          <a:lstStyle/>
+          <a:p>
+            <a:r>
+              <a:rPr lang="fr-FR">
+                <a:cs typeface="Calibri"/>
+              </a:rPr>
+              <a:t>Pouvoir créer un compte</a:t>
+            </a:r>
+          </a:p>
+          <a:p>
+            <a:r>
+              <a:rPr lang="fr-FR">
+                <a:cs typeface="Calibri"/>
+              </a:rPr>
+              <a:t>Pouvoir se connecter</a:t>
+            </a:r>
+          </a:p>
+          <a:p>
+            <a:r>
+              <a:rPr lang="fr-FR">
+                <a:cs typeface="Calibri"/>
+              </a:rPr>
+              <a:t>Pouvoir ajouter des photos à son compte</a:t>
+            </a:r>
+          </a:p>
+          <a:p>
+            <a:pPr marL="457200" lvl="1" indent="0">
+              <a:buNone/>
+            </a:pPr>
+            <a:endParaRPr lang="fr-FR">
+              <a:cs typeface="Calibri"/>
+            </a:endParaRPr>
+          </a:p>
+          <a:p>
+            <a:r>
+              <a:rPr lang="fr-FR">
+                <a:cs typeface="Calibri"/>
+              </a:rPr>
+              <a:t>Pouvoir ajouter une serrure à son compte</a:t>
+            </a:r>
+          </a:p>
+          <a:p>
+            <a:r>
+              <a:rPr lang="fr-FR">
+                <a:cs typeface="Calibri"/>
+              </a:rPr>
+              <a:t>Pouvoir autoriser des personnes à ouvrir la serrure</a:t>
+            </a:r>
+          </a:p>
+        </p:txBody>
+      </p:sp>
     </p:spTree>
     <p:extLst>
       <p:ext uri="{BB962C8B-B14F-4D97-AF65-F5344CB8AC3E}">
-        <p14:creationId xmlns:p14="http://schemas.microsoft.com/office/powerpoint/2010/main" val="2991003569"/>
+        <p14:creationId xmlns:p14="http://schemas.microsoft.com/office/powerpoint/2010/main" val="1174928216"/>
       </p:ext>
     </p:extLst>
   </p:cSld>
@@ -4997,7 +6338,7 @@
           <p:cNvPr id="2" name="Titre 1">
             <a:extLst>
               <a:ext uri="{FF2B5EF4-FFF2-40B4-BE49-F238E27FC236}">
-                <a16:creationId xmlns:a16="http://schemas.microsoft.com/office/drawing/2014/main" id="{7C8A0A64-0237-4A27-9EBD-4F068AC3929A}"/>
+                <a16:creationId xmlns:a16="http://schemas.microsoft.com/office/drawing/2014/main" id="{EA6BFFC5-D927-40D4-9EBB-522110615E77}"/>
               </a:ext>
             </a:extLst>
           </p:cNvPr>
@@ -5017,7 +6358,7 @@
               <a:rPr lang="fr-FR">
                 <a:cs typeface="Calibri Light"/>
               </a:rPr>
-              <a:t>Ambitions</a:t>
+              <a:t>POC: Côté serveur</a:t>
             </a:r>
             <a:endParaRPr lang="fr-FR"/>
           </a:p>
@@ -5025,10 +6366,10 @@
       </p:sp>
       <p:sp>
         <p:nvSpPr>
-          <p:cNvPr id="4" name="Espace réservé du contenu 3">
+          <p:cNvPr id="8" name="Espace réservé du contenu 3">
             <a:extLst>
               <a:ext uri="{FF2B5EF4-FFF2-40B4-BE49-F238E27FC236}">
-                <a16:creationId xmlns:a16="http://schemas.microsoft.com/office/drawing/2014/main" id="{5127A38B-E8AF-4D4A-8AB9-726193B5DD9F}"/>
+                <a16:creationId xmlns:a16="http://schemas.microsoft.com/office/drawing/2014/main" id="{35B02C52-279A-4437-B7B9-23329EC3F2C4}"/>
               </a:ext>
             </a:extLst>
           </p:cNvPr>
@@ -5039,7 +6380,12 @@
             <p:ph sz="half" idx="2"/>
           </p:nvPr>
         </p:nvSpPr>
-        <p:spPr/>
+        <p:spPr>
+          <a:xfrm>
+            <a:off x="839788" y="2007474"/>
+            <a:ext cx="9555216" cy="4632441"/>
+          </a:xfrm>
+        </p:spPr>
         <p:txBody>
           <a:bodyPr vert="horz" lIns="91440" tIns="45720" rIns="91440" bIns="45720" rtlCol="0" anchor="t">
             <a:normAutofit/>
@@ -5050,46 +6396,36 @@
               <a:rPr lang="fr-FR">
                 <a:cs typeface="Calibri"/>
               </a:rPr>
-              <a:t>Monter en compétences sur les technologies utilisées</a:t>
-            </a:r>
-            <a:endParaRPr lang="fr-FR"/>
-          </a:p>
-        </p:txBody>
-      </p:sp>
-      <p:pic>
-        <p:nvPicPr>
-          <p:cNvPr id="8" name="Image 8">
-            <a:extLst>
-              <a:ext uri="{FF2B5EF4-FFF2-40B4-BE49-F238E27FC236}">
-                <a16:creationId xmlns:a16="http://schemas.microsoft.com/office/drawing/2014/main" id="{A6012146-3359-4A07-8761-091D0917F6D9}"/>
-              </a:ext>
-            </a:extLst>
-          </p:cNvPr>
-          <p:cNvPicPr>
-            <a:picLocks noChangeAspect="1"/>
-          </p:cNvPicPr>
-          <p:nvPr/>
-        </p:nvPicPr>
-        <p:blipFill>
-          <a:blip r:embed="rId2"/>
-          <a:stretch>
-            <a:fillRect/>
-          </a:stretch>
-        </p:blipFill>
-        <p:spPr>
-          <a:xfrm>
-            <a:off x="8174657" y="2445834"/>
-            <a:ext cx="2143125" cy="2133600"/>
-          </a:xfrm>
-          <a:prstGeom prst="rect">
-            <a:avLst/>
-          </a:prstGeom>
-        </p:spPr>
-      </p:pic>
+              <a:t>Une API REST qui répond aux fonctionnalités citées </a:t>
+            </a:r>
+          </a:p>
+          <a:p>
+            <a:r>
+              <a:rPr lang="fr-FR">
+                <a:cs typeface="Calibri"/>
+              </a:rPr>
+              <a:t>Une base de données</a:t>
+            </a:r>
+          </a:p>
+          <a:p>
+            <a:endParaRPr lang="fr-FR">
+              <a:cs typeface="Calibri"/>
+            </a:endParaRPr>
+          </a:p>
+          <a:p>
+            <a:r>
+              <a:rPr lang="fr-FR">
+                <a:cs typeface="Calibri"/>
+              </a:rPr>
+              <a:t>Une intelligence artificielle dotée de reconnaissance faciale</a:t>
+            </a:r>
+          </a:p>
+        </p:txBody>
+      </p:sp>
     </p:spTree>
     <p:extLst>
       <p:ext uri="{BB962C8B-B14F-4D97-AF65-F5344CB8AC3E}">
-        <p14:creationId xmlns:p14="http://schemas.microsoft.com/office/powerpoint/2010/main" val="1866678013"/>
+        <p14:creationId xmlns:p14="http://schemas.microsoft.com/office/powerpoint/2010/main" val="719505432"/>
       </p:ext>
     </p:extLst>
   </p:cSld>
@@ -5102,14 +6438,6 @@
 <file path=ppt/slides/slide9.xml><?xml version="1.0" encoding="utf-8"?>
 <p:sld xmlns:a="http://schemas.openxmlformats.org/drawingml/2006/main" xmlns:r="http://schemas.openxmlformats.org/officeDocument/2006/relationships" xmlns:p="http://schemas.openxmlformats.org/presentationml/2006/main">
   <p:cSld>
-    <p:bg>
-      <p:bgPr>
-        <a:solidFill>
-          <a:schemeClr val="bg1"/>
-        </a:solidFill>
-        <a:effectLst/>
-      </p:bgPr>
-    </p:bg>
     <p:spTree>
       <p:nvGrpSpPr>
         <p:cNvPr id="1" name=""/>
@@ -5124,656 +6452,108 @@
           <a:chExt cx="0" cy="0"/>
         </a:xfrm>
       </p:grpSpPr>
-      <p:sp useBgFill="1">
-        <p:nvSpPr>
-          <p:cNvPr id="8" name="Rectangle 7">
+      <p:sp>
+        <p:nvSpPr>
+          <p:cNvPr id="2" name="Titre 1">
             <a:extLst>
               <a:ext uri="{FF2B5EF4-FFF2-40B4-BE49-F238E27FC236}">
-                <a16:creationId xmlns:a16="http://schemas.microsoft.com/office/drawing/2014/main" id="{559AE206-7EBA-4D33-8BC9-9D8158553F0E}"/>
-              </a:ext>
-              <a:ext uri="{C183D7F6-B498-43B3-948B-1728B52AA6E4}">
-                <adec:decorative xmlns:adec="http://schemas.microsoft.com/office/drawing/2017/decorative" val="1"/>
+                <a16:creationId xmlns:a16="http://schemas.microsoft.com/office/drawing/2014/main" id="{39CB05C1-791D-46C4-931A-6545A1B8DBB5}"/>
               </a:ext>
             </a:extLst>
           </p:cNvPr>
           <p:cNvSpPr>
-            <a:spLocks noGrp="1" noRot="1" noChangeAspect="1" noMove="1" noResize="1" noEditPoints="1" noAdjustHandles="1" noChangeArrowheads="1" noChangeShapeType="1" noTextEdit="1"/>
-          </p:cNvSpPr>
-          <p:nvPr>
-            <p:extLst>
-              <p:ext uri="{386F3935-93C4-4BCD-93E2-E3B085C9AB24}">
-                <p16:designElem xmlns:p16="http://schemas.microsoft.com/office/powerpoint/2015/main" val="1"/>
-              </p:ext>
-            </p:extLst>
-          </p:nvPr>
-        </p:nvSpPr>
-        <p:spPr>
-          <a:xfrm>
-            <a:off x="0" y="0"/>
-            <a:ext cx="12192000" cy="6858000"/>
-          </a:xfrm>
-          <a:prstGeom prst="rect">
-            <a:avLst/>
-          </a:prstGeom>
-          <a:ln>
-            <a:noFill/>
-          </a:ln>
-        </p:spPr>
-        <p:style>
-          <a:lnRef idx="2">
-            <a:schemeClr val="accent1">
-              <a:shade val="50000"/>
-            </a:schemeClr>
-          </a:lnRef>
-          <a:fillRef idx="1">
-            <a:schemeClr val="accent1"/>
-          </a:fillRef>
-          <a:effectRef idx="0">
-            <a:schemeClr val="accent1"/>
-          </a:effectRef>
-          <a:fontRef idx="minor">
-            <a:schemeClr val="lt1"/>
-          </a:fontRef>
-        </p:style>
-        <p:txBody>
-          <a:bodyPr rtlCol="0" anchor="ctr"/>
-          <a:lstStyle/>
-          <a:p>
-            <a:pPr marL="0" marR="0" lvl="0" indent="0" algn="ctr" defTabSz="914400" rtl="0" eaLnBrk="1" fontAlgn="auto" latinLnBrk="0" hangingPunct="1">
-              <a:lnSpc>
-                <a:spcPct val="100000"/>
-              </a:lnSpc>
-              <a:spcBef>
-                <a:spcPts val="0"/>
-              </a:spcBef>
-              <a:spcAft>
-                <a:spcPts val="0"/>
-              </a:spcAft>
-              <a:buClrTx/>
-              <a:buSzTx/>
-              <a:buFontTx/>
-              <a:buNone/>
-              <a:tabLst/>
-              <a:defRPr/>
-            </a:pPr>
-            <a:endParaRPr kumimoji="0" lang="en-US" sz="1800" b="0" i="0" u="none" strike="noStrike" kern="1200" cap="none" spc="0" normalizeH="0" baseline="0" noProof="0">
-              <a:ln>
-                <a:noFill/>
-              </a:ln>
-              <a:solidFill>
-                <a:prstClr val="white"/>
-              </a:solidFill>
-              <a:effectLst/>
-              <a:uLnTx/>
-              <a:uFillTx/>
-              <a:latin typeface="Calibri" panose="020F0502020204030204"/>
-              <a:ea typeface="+mn-ea"/>
-              <a:cs typeface="+mn-cs"/>
-            </a:endParaRPr>
-          </a:p>
-        </p:txBody>
-      </p:sp>
-      <p:sp>
-        <p:nvSpPr>
-          <p:cNvPr id="2" name="Titre 1"/>
-          <p:cNvSpPr>
-            <a:spLocks noGrp="1"/>
-          </p:cNvSpPr>
-          <p:nvPr>
-            <p:ph type="ctrTitle"/>
-          </p:nvPr>
-        </p:nvSpPr>
-        <p:spPr>
-          <a:xfrm>
-            <a:off x="838199" y="4525347"/>
-            <a:ext cx="6801321" cy="1737360"/>
-          </a:xfrm>
-        </p:spPr>
-        <p:txBody>
-          <a:bodyPr anchor="ctr">
-            <a:normAutofit/>
-          </a:bodyPr>
-          <a:lstStyle/>
-          <a:p>
-            <a:pPr algn="r"/>
-            <a:r>
-              <a:rPr lang="de-DE">
+            <a:spLocks noGrp="1"/>
+          </p:cNvSpPr>
+          <p:nvPr>
+            <p:ph type="title"/>
+          </p:nvPr>
+        </p:nvSpPr>
+        <p:spPr/>
+        <p:txBody>
+          <a:bodyPr/>
+          <a:lstStyle/>
+          <a:p>
+            <a:r>
+              <a:rPr lang="fr-FR">
                 <a:cs typeface="Calibri Light"/>
               </a:rPr>
-              <a:t>EasyLock</a:t>
-            </a:r>
-            <a:endParaRPr lang="de-DE"/>
-          </a:p>
-        </p:txBody>
-      </p:sp>
-      <p:sp>
-        <p:nvSpPr>
-          <p:cNvPr id="3" name="Sous-titre 2"/>
-          <p:cNvSpPr>
-            <a:spLocks noGrp="1"/>
-          </p:cNvSpPr>
-          <p:nvPr>
-            <p:ph type="subTitle" idx="1"/>
-          </p:nvPr>
-        </p:nvSpPr>
-        <p:spPr>
-          <a:xfrm>
-            <a:off x="7961258" y="4525347"/>
-            <a:ext cx="3258675" cy="1737360"/>
-          </a:xfrm>
-        </p:spPr>
-        <p:txBody>
-          <a:bodyPr anchor="ctr">
-            <a:normAutofit/>
-          </a:bodyPr>
-          <a:lstStyle/>
-          <a:p>
-            <a:pPr algn="l"/>
-            <a:r>
-              <a:rPr lang="de-DE">
-                <a:cs typeface="Calibri"/>
-              </a:rPr>
-              <a:t>Projet Libre</a:t>
-            </a:r>
-          </a:p>
-          <a:p>
-            <a:pPr algn="l"/>
-            <a:r>
-              <a:rPr lang="de-DE">
-                <a:cs typeface="Calibri"/>
-              </a:rPr>
-              <a:t>Colin CAZABET</a:t>
-            </a:r>
-          </a:p>
-        </p:txBody>
-      </p:sp>
-      <p:sp>
-        <p:nvSpPr>
-          <p:cNvPr id="10" name="Oval 9">
+              <a:t>Technologies</a:t>
+            </a:r>
+            <a:endParaRPr lang="fr-FR"/>
+          </a:p>
+        </p:txBody>
+      </p:sp>
+      <p:sp>
+        <p:nvSpPr>
+          <p:cNvPr id="8" name="Text Placeholder 4">
             <a:extLst>
               <a:ext uri="{FF2B5EF4-FFF2-40B4-BE49-F238E27FC236}">
-                <a16:creationId xmlns:a16="http://schemas.microsoft.com/office/drawing/2014/main" id="{6437D937-A7F1-4011-92B4-328E5BE1B166}"/>
-              </a:ext>
-              <a:ext uri="{C183D7F6-B498-43B3-948B-1728B52AA6E4}">
-                <adec:decorative xmlns:adec="http://schemas.microsoft.com/office/drawing/2017/decorative" val="1"/>
+                <a16:creationId xmlns:a16="http://schemas.microsoft.com/office/drawing/2014/main" id="{E142076A-D80B-4913-BCF7-D53488E6982E}"/>
               </a:ext>
             </a:extLst>
           </p:cNvPr>
           <p:cNvSpPr>
-            <a:spLocks noGrp="1" noRot="1" noChangeAspect="1" noMove="1" noResize="1" noEditPoints="1" noAdjustHandles="1" noChangeArrowheads="1" noChangeShapeType="1" noTextEdit="1"/>
-          </p:cNvSpPr>
-          <p:nvPr>
-            <p:extLst>
-              <p:ext uri="{386F3935-93C4-4BCD-93E2-E3B085C9AB24}">
-                <p16:designElem xmlns:p16="http://schemas.microsoft.com/office/powerpoint/2015/main" val="1"/>
-              </p:ext>
-            </p:extLst>
+            <a:spLocks noGrp="1"/>
+          </p:cNvSpPr>
+          <p:nvPr>
+            <p:ph sz="half" idx="2"/>
           </p:nvPr>
         </p:nvSpPr>
         <p:spPr>
           <a:xfrm>
-            <a:off x="588567" y="620480"/>
-            <a:ext cx="2243800" cy="2243796"/>
+            <a:off x="841297" y="2979909"/>
+            <a:ext cx="5181600" cy="4351338"/>
           </a:xfrm>
-          <a:prstGeom prst="ellipse">
-            <a:avLst/>
-          </a:prstGeom>
-          <a:solidFill>
-            <a:schemeClr val="accent5"/>
-          </a:solidFill>
-          <a:ln>
-            <a:noFill/>
-          </a:ln>
         </p:spPr>
-        <p:style>
-          <a:lnRef idx="2">
-            <a:schemeClr val="accent1">
-              <a:shade val="50000"/>
-            </a:schemeClr>
-          </a:lnRef>
-          <a:fillRef idx="1">
-            <a:schemeClr val="accent1"/>
-          </a:fillRef>
-          <a:effectRef idx="0">
-            <a:schemeClr val="accent1"/>
-          </a:effectRef>
-          <a:fontRef idx="minor">
-            <a:schemeClr val="lt1"/>
-          </a:fontRef>
-        </p:style>
-        <p:txBody>
-          <a:bodyPr rtlCol="0" anchor="ctr"/>
-          <a:lstStyle/>
-          <a:p>
-            <a:pPr marL="0" marR="0" lvl="0" indent="0" algn="ctr" defTabSz="914400" rtl="0" eaLnBrk="1" fontAlgn="auto" latinLnBrk="0" hangingPunct="1">
-              <a:lnSpc>
-                <a:spcPct val="100000"/>
-              </a:lnSpc>
-              <a:spcBef>
-                <a:spcPts val="0"/>
-              </a:spcBef>
-              <a:spcAft>
-                <a:spcPts val="0"/>
-              </a:spcAft>
-              <a:buClrTx/>
-              <a:buSzTx/>
-              <a:buFontTx/>
-              <a:buNone/>
-              <a:tabLst/>
-              <a:defRPr/>
-            </a:pPr>
-            <a:endParaRPr kumimoji="0" lang="en-US" sz="1800" b="0" i="0" u="none" strike="noStrike" kern="1200" cap="none" spc="0" normalizeH="0" baseline="0" noProof="0">
-              <a:ln>
-                <a:noFill/>
-              </a:ln>
-              <a:solidFill>
-                <a:prstClr val="white"/>
-              </a:solidFill>
-              <a:effectLst/>
-              <a:uLnTx/>
-              <a:uFillTx/>
-              <a:latin typeface="Calibri" panose="020F0502020204030204"/>
-              <a:ea typeface="+mn-ea"/>
-              <a:cs typeface="+mn-cs"/>
-            </a:endParaRPr>
-          </a:p>
-        </p:txBody>
-      </p:sp>
-      <p:sp>
-        <p:nvSpPr>
-          <p:cNvPr id="12" name="Oval 11">
-            <a:extLst>
-              <a:ext uri="{FF2B5EF4-FFF2-40B4-BE49-F238E27FC236}">
-                <a16:creationId xmlns:a16="http://schemas.microsoft.com/office/drawing/2014/main" id="{B672F332-AF08-46C6-94F0-77684310D7B7}"/>
-              </a:ext>
-              <a:ext uri="{C183D7F6-B498-43B3-948B-1728B52AA6E4}">
-                <adec:decorative xmlns:adec="http://schemas.microsoft.com/office/drawing/2017/decorative" val="1"/>
-              </a:ext>
-            </a:extLst>
-          </p:cNvPr>
-          <p:cNvSpPr>
-            <a:spLocks noGrp="1" noRot="1" noChangeAspect="1" noMove="1" noResize="1" noEditPoints="1" noAdjustHandles="1" noChangeArrowheads="1" noChangeShapeType="1" noTextEdit="1"/>
-          </p:cNvSpPr>
-          <p:nvPr>
-            <p:extLst>
-              <p:ext uri="{386F3935-93C4-4BCD-93E2-E3B085C9AB24}">
-                <p16:designElem xmlns:p16="http://schemas.microsoft.com/office/powerpoint/2015/main" val="1"/>
-              </p:ext>
-            </p:extLst>
-          </p:nvPr>
-        </p:nvSpPr>
-        <p:spPr>
-          <a:xfrm>
-            <a:off x="3395001" y="2466604"/>
-            <a:ext cx="962395" cy="962395"/>
-          </a:xfrm>
-          <a:prstGeom prst="ellipse">
-            <a:avLst/>
-          </a:prstGeom>
-          <a:solidFill>
-            <a:schemeClr val="accent4"/>
-          </a:solidFill>
-          <a:ln>
-            <a:noFill/>
-          </a:ln>
-        </p:spPr>
-        <p:style>
-          <a:lnRef idx="2">
-            <a:schemeClr val="accent1">
-              <a:shade val="50000"/>
-            </a:schemeClr>
-          </a:lnRef>
-          <a:fillRef idx="1">
-            <a:schemeClr val="accent1"/>
-          </a:fillRef>
-          <a:effectRef idx="0">
-            <a:schemeClr val="accent1"/>
-          </a:effectRef>
-          <a:fontRef idx="minor">
-            <a:schemeClr val="lt1"/>
-          </a:fontRef>
-        </p:style>
-        <p:txBody>
-          <a:bodyPr rtlCol="0" anchor="ctr"/>
-          <a:lstStyle/>
-          <a:p>
-            <a:pPr marL="0" marR="0" lvl="0" indent="0" algn="ctr" defTabSz="914400" rtl="0" eaLnBrk="1" fontAlgn="auto" latinLnBrk="0" hangingPunct="1">
-              <a:lnSpc>
-                <a:spcPct val="100000"/>
-              </a:lnSpc>
-              <a:spcBef>
-                <a:spcPts val="0"/>
-              </a:spcBef>
-              <a:spcAft>
-                <a:spcPts val="0"/>
-              </a:spcAft>
-              <a:buClrTx/>
-              <a:buSzTx/>
-              <a:buFontTx/>
-              <a:buNone/>
-              <a:tabLst/>
-              <a:defRPr/>
-            </a:pPr>
-            <a:endParaRPr kumimoji="0" lang="en-US" sz="1800" b="0" i="0" u="none" strike="noStrike" kern="1200" cap="none" spc="0" normalizeH="0" baseline="0" noProof="0">
-              <a:ln>
-                <a:noFill/>
-              </a:ln>
-              <a:solidFill>
-                <a:prstClr val="white"/>
-              </a:solidFill>
-              <a:effectLst/>
-              <a:uLnTx/>
-              <a:uFillTx/>
-              <a:latin typeface="Calibri" panose="020F0502020204030204"/>
-              <a:ea typeface="+mn-ea"/>
-              <a:cs typeface="+mn-cs"/>
-            </a:endParaRPr>
-          </a:p>
-        </p:txBody>
-      </p:sp>
-      <p:sp>
-        <p:nvSpPr>
-          <p:cNvPr id="14" name="Oval 13">
-            <a:extLst>
-              <a:ext uri="{FF2B5EF4-FFF2-40B4-BE49-F238E27FC236}">
-                <a16:creationId xmlns:a16="http://schemas.microsoft.com/office/drawing/2014/main" id="{34244EF8-D73A-40E1-BE73-D46E6B4B04ED}"/>
-              </a:ext>
-              <a:ext uri="{C183D7F6-B498-43B3-948B-1728B52AA6E4}">
-                <adec:decorative xmlns:adec="http://schemas.microsoft.com/office/drawing/2017/decorative" val="1"/>
-              </a:ext>
-            </a:extLst>
-          </p:cNvPr>
-          <p:cNvSpPr>
-            <a:spLocks noGrp="1" noRot="1" noChangeAspect="1" noMove="1" noResize="1" noEditPoints="1" noAdjustHandles="1" noChangeArrowheads="1" noChangeShapeType="1" noTextEdit="1"/>
-          </p:cNvSpPr>
-          <p:nvPr>
-            <p:extLst>
-              <p:ext uri="{386F3935-93C4-4BCD-93E2-E3B085C9AB24}">
-                <p16:designElem xmlns:p16="http://schemas.microsoft.com/office/powerpoint/2015/main" val="1"/>
-              </p:ext>
-            </p:extLst>
-          </p:nvPr>
-        </p:nvSpPr>
-        <p:spPr>
-          <a:xfrm>
-            <a:off x="5125829" y="2327988"/>
-            <a:ext cx="293695" cy="293695"/>
-          </a:xfrm>
-          <a:prstGeom prst="ellipse">
-            <a:avLst/>
-          </a:prstGeom>
-          <a:solidFill>
-            <a:schemeClr val="accent3"/>
-          </a:solidFill>
-          <a:ln>
-            <a:noFill/>
-          </a:ln>
-        </p:spPr>
-        <p:style>
-          <a:lnRef idx="2">
-            <a:schemeClr val="accent1">
-              <a:shade val="50000"/>
-            </a:schemeClr>
-          </a:lnRef>
-          <a:fillRef idx="1">
-            <a:schemeClr val="accent1"/>
-          </a:fillRef>
-          <a:effectRef idx="0">
-            <a:schemeClr val="accent1"/>
-          </a:effectRef>
-          <a:fontRef idx="minor">
-            <a:schemeClr val="lt1"/>
-          </a:fontRef>
-        </p:style>
-        <p:txBody>
-          <a:bodyPr rtlCol="0" anchor="ctr"/>
-          <a:lstStyle/>
-          <a:p>
-            <a:pPr marL="0" marR="0" lvl="0" indent="0" algn="ctr" defTabSz="914400" rtl="0" eaLnBrk="1" fontAlgn="auto" latinLnBrk="0" hangingPunct="1">
-              <a:lnSpc>
-                <a:spcPct val="100000"/>
-              </a:lnSpc>
-              <a:spcBef>
-                <a:spcPts val="0"/>
-              </a:spcBef>
-              <a:spcAft>
-                <a:spcPts val="0"/>
-              </a:spcAft>
-              <a:buClrTx/>
-              <a:buSzTx/>
-              <a:buFontTx/>
-              <a:buNone/>
-              <a:tabLst/>
-              <a:defRPr/>
-            </a:pPr>
-            <a:endParaRPr kumimoji="0" lang="en-US" sz="1800" b="0" i="0" u="none" strike="noStrike" kern="1200" cap="none" spc="0" normalizeH="0" baseline="0" noProof="0">
-              <a:ln>
-                <a:noFill/>
-              </a:ln>
-              <a:solidFill>
-                <a:prstClr val="white"/>
-              </a:solidFill>
-              <a:effectLst/>
-              <a:uLnTx/>
-              <a:uFillTx/>
-              <a:latin typeface="Calibri" panose="020F0502020204030204"/>
-              <a:ea typeface="+mn-ea"/>
-              <a:cs typeface="+mn-cs"/>
-            </a:endParaRPr>
-          </a:p>
-        </p:txBody>
-      </p:sp>
-      <p:sp>
-        <p:nvSpPr>
-          <p:cNvPr id="16" name="Freeform: Shape 15">
-            <a:extLst>
-              <a:ext uri="{FF2B5EF4-FFF2-40B4-BE49-F238E27FC236}">
-                <a16:creationId xmlns:a16="http://schemas.microsoft.com/office/drawing/2014/main" id="{AB84D7E8-4ECB-42D7-ADBF-01689B0F24AE}"/>
-              </a:ext>
-              <a:ext uri="{C183D7F6-B498-43B3-948B-1728B52AA6E4}">
-                <adec:decorative xmlns:adec="http://schemas.microsoft.com/office/drawing/2017/decorative" val="1"/>
-              </a:ext>
-            </a:extLst>
-          </p:cNvPr>
-          <p:cNvSpPr>
-            <a:spLocks noGrp="1" noRot="1" noChangeAspect="1" noMove="1" noResize="1" noEditPoints="1" noAdjustHandles="1" noChangeArrowheads="1" noChangeShapeType="1" noTextEdit="1"/>
-          </p:cNvSpPr>
-          <p:nvPr>
-            <p:extLst>
-              <p:ext uri="{386F3935-93C4-4BCD-93E2-E3B085C9AB24}">
-                <p16:designElem xmlns:p16="http://schemas.microsoft.com/office/powerpoint/2015/main" val="1"/>
-              </p:ext>
-            </p:extLst>
-          </p:nvPr>
-        </p:nvSpPr>
-        <p:spPr>
-          <a:xfrm>
-            <a:off x="6492113" y="0"/>
-            <a:ext cx="5699887" cy="4059244"/>
-          </a:xfrm>
-          <a:custGeom>
-            <a:avLst/>
-            <a:gdLst>
-              <a:gd name="connsiteX0" fmla="*/ 0 w 5699887"/>
-              <a:gd name="connsiteY0" fmla="*/ 0 h 4059244"/>
-              <a:gd name="connsiteX1" fmla="*/ 5699887 w 5699887"/>
-              <a:gd name="connsiteY1" fmla="*/ 0 h 4059244"/>
-              <a:gd name="connsiteX2" fmla="*/ 5699887 w 5699887"/>
-              <a:gd name="connsiteY2" fmla="*/ 3944096 h 4059244"/>
-              <a:gd name="connsiteX3" fmla="*/ 5525775 w 5699887"/>
-              <a:gd name="connsiteY3" fmla="*/ 3980429 h 4059244"/>
-              <a:gd name="connsiteX4" fmla="*/ 4663256 w 5699887"/>
-              <a:gd name="connsiteY4" fmla="*/ 4059244 h 4059244"/>
-              <a:gd name="connsiteX5" fmla="*/ 8566 w 5699887"/>
-              <a:gd name="connsiteY5" fmla="*/ 67422 h 4059244"/>
-            </a:gdLst>
-            <a:ahLst/>
-            <a:cxnLst>
-              <a:cxn ang="0">
-                <a:pos x="connsiteX0" y="connsiteY0"/>
-              </a:cxn>
-              <a:cxn ang="0">
-                <a:pos x="connsiteX1" y="connsiteY1"/>
-              </a:cxn>
-              <a:cxn ang="0">
-                <a:pos x="connsiteX2" y="connsiteY2"/>
-              </a:cxn>
-              <a:cxn ang="0">
-                <a:pos x="connsiteX3" y="connsiteY3"/>
-              </a:cxn>
-              <a:cxn ang="0">
-                <a:pos x="connsiteX4" y="connsiteY4"/>
-              </a:cxn>
-              <a:cxn ang="0">
-                <a:pos x="connsiteX5" y="connsiteY5"/>
-              </a:cxn>
-            </a:cxnLst>
-            <a:rect l="l" t="t" r="r" b="b"/>
-            <a:pathLst>
-              <a:path w="5699887" h="4059244">
-                <a:moveTo>
-                  <a:pt x="0" y="0"/>
-                </a:moveTo>
-                <a:lnTo>
-                  <a:pt x="5699887" y="0"/>
-                </a:lnTo>
-                <a:lnTo>
-                  <a:pt x="5699887" y="3944096"/>
-                </a:lnTo>
-                <a:lnTo>
-                  <a:pt x="5525775" y="3980429"/>
-                </a:lnTo>
-                <a:cubicBezTo>
-                  <a:pt x="5246154" y="4032190"/>
-                  <a:pt x="4957865" y="4059244"/>
-                  <a:pt x="4663256" y="4059244"/>
-                </a:cubicBezTo>
-                <a:cubicBezTo>
-                  <a:pt x="2306390" y="4059244"/>
-                  <a:pt x="353936" y="2327747"/>
-                  <a:pt x="8566" y="67422"/>
-                </a:cubicBezTo>
-                <a:close/>
-              </a:path>
-            </a:pathLst>
-          </a:custGeom>
-          <a:solidFill>
-            <a:srgbClr val="595959"/>
-          </a:solidFill>
-          <a:ln>
-            <a:noFill/>
-          </a:ln>
-        </p:spPr>
-        <p:style>
-          <a:lnRef idx="2">
-            <a:schemeClr val="accent1">
-              <a:shade val="50000"/>
-            </a:schemeClr>
-          </a:lnRef>
-          <a:fillRef idx="1">
-            <a:schemeClr val="accent1"/>
-          </a:fillRef>
-          <a:effectRef idx="0">
-            <a:schemeClr val="accent1"/>
-          </a:effectRef>
-          <a:fontRef idx="minor">
-            <a:schemeClr val="lt1"/>
-          </a:fontRef>
-        </p:style>
-        <p:txBody>
-          <a:bodyPr rtlCol="0" anchor="ctr"/>
-          <a:lstStyle/>
-          <a:p>
-            <a:pPr marL="0" marR="0" lvl="0" indent="0" algn="ctr" defTabSz="914400" rtl="0" eaLnBrk="1" fontAlgn="auto" latinLnBrk="0" hangingPunct="1">
-              <a:lnSpc>
-                <a:spcPct val="100000"/>
-              </a:lnSpc>
-              <a:spcBef>
-                <a:spcPts val="0"/>
-              </a:spcBef>
-              <a:spcAft>
-                <a:spcPts val="0"/>
-              </a:spcAft>
-              <a:buClrTx/>
-              <a:buSzTx/>
-              <a:buFontTx/>
-              <a:buNone/>
-              <a:tabLst/>
-              <a:defRPr/>
-            </a:pPr>
-            <a:endParaRPr kumimoji="0" lang="en-US" sz="1800" b="0" i="0" u="none" strike="noStrike" kern="1200" cap="none" spc="0" normalizeH="0" baseline="0" noProof="0">
-              <a:ln>
-                <a:noFill/>
-              </a:ln>
-              <a:solidFill>
-                <a:prstClr val="white"/>
-              </a:solidFill>
-              <a:effectLst/>
-              <a:uLnTx/>
-              <a:uFillTx/>
-              <a:latin typeface="Calibri" panose="020F0502020204030204"/>
-              <a:ea typeface="+mn-ea"/>
-              <a:cs typeface="+mn-cs"/>
-            </a:endParaRPr>
-          </a:p>
-        </p:txBody>
-      </p:sp>
-      <p:cxnSp>
-        <p:nvCxnSpPr>
-          <p:cNvPr id="18" name="Straight Connector 17">
-            <a:extLst>
-              <a:ext uri="{FF2B5EF4-FFF2-40B4-BE49-F238E27FC236}">
-                <a16:creationId xmlns:a16="http://schemas.microsoft.com/office/drawing/2014/main" id="{9E8E38ED-369A-44C2-B635-0BED0E48A6E8}"/>
-              </a:ext>
-              <a:ext uri="{C183D7F6-B498-43B3-948B-1728B52AA6E4}">
-                <adec:decorative xmlns:adec="http://schemas.microsoft.com/office/drawing/2017/decorative" val="1"/>
-              </a:ext>
-            </a:extLst>
-          </p:cNvPr>
-          <p:cNvCxnSpPr>
-            <a:cxnSpLocks noGrp="1" noRot="1" noChangeAspect="1" noMove="1" noResize="1" noEditPoints="1" noAdjustHandles="1" noChangeArrowheads="1" noChangeShapeType="1"/>
-          </p:cNvCxnSpPr>
-          <p:nvPr>
-            <p:extLst>
-              <p:ext uri="{386F3935-93C4-4BCD-93E2-E3B085C9AB24}">
-                <p16:designElem xmlns:p16="http://schemas.microsoft.com/office/powerpoint/2015/main" val="1"/>
-              </p:ext>
-            </p:extLst>
-          </p:nvPr>
-        </p:nvCxnSpPr>
-        <p:spPr>
-          <a:xfrm>
-            <a:off x="7800392" y="4525347"/>
-            <a:ext cx="0" cy="1737360"/>
-          </a:xfrm>
-          <a:prstGeom prst="line">
-            <a:avLst/>
-          </a:prstGeom>
-          <a:ln w="19050" cap="sq">
-            <a:solidFill>
-              <a:schemeClr val="tx1"/>
-            </a:solidFill>
-          </a:ln>
-        </p:spPr>
-        <p:style>
-          <a:lnRef idx="1">
-            <a:schemeClr val="accent1"/>
-          </a:lnRef>
-          <a:fillRef idx="0">
-            <a:schemeClr val="accent1"/>
-          </a:fillRef>
-          <a:effectRef idx="0">
-            <a:schemeClr val="accent1"/>
-          </a:effectRef>
-          <a:fontRef idx="minor">
-            <a:schemeClr val="tx1"/>
-          </a:fontRef>
-        </p:style>
-      </p:cxnSp>
+        <p:txBody>
+          <a:bodyPr vert="horz" lIns="91440" tIns="45720" rIns="91440" bIns="45720" rtlCol="0" anchor="t">
+            <a:normAutofit/>
+          </a:bodyPr>
+          <a:lstStyle/>
+          <a:p>
+            <a:r>
+              <a:rPr lang="en-US">
+                <a:cs typeface="Calibri"/>
+              </a:rPr>
+              <a:t>Docker</a:t>
+            </a:r>
+          </a:p>
+          <a:p>
+            <a:r>
+              <a:rPr lang="en-US">
+                <a:cs typeface="Calibri"/>
+              </a:rPr>
+              <a:t>Google </a:t>
+            </a:r>
+            <a:r>
+              <a:rPr lang="en-US" err="1">
+                <a:cs typeface="Calibri"/>
+              </a:rPr>
+              <a:t>Tensorflow</a:t>
+            </a:r>
+          </a:p>
+          <a:p>
+            <a:r>
+              <a:rPr lang="en-US">
+                <a:cs typeface="Calibri"/>
+              </a:rPr>
+              <a:t>Django</a:t>
+            </a:r>
+          </a:p>
+          <a:p>
+            <a:r>
+              <a:rPr lang="en-US">
+                <a:cs typeface="Calibri"/>
+              </a:rPr>
+              <a:t>React JS</a:t>
+            </a:r>
+          </a:p>
+        </p:txBody>
+      </p:sp>
     </p:spTree>
     <p:extLst>
       <p:ext uri="{BB962C8B-B14F-4D97-AF65-F5344CB8AC3E}">
-        <p14:creationId xmlns:p14="http://schemas.microsoft.com/office/powerpoint/2010/main" val="4141796255"/>
+        <p14:creationId xmlns:p14="http://schemas.microsoft.com/office/powerpoint/2010/main" val="488360729"/>
       </p:ext>
     </p:extLst>
   </p:cSld>

</xml_diff>